<commit_message>
Update slides and added a sample
</commit_message>
<xml_diff>
--- a/IntroductionAPI/ProgrammingAPI.pptx
+++ b/IntroductionAPI/ProgrammingAPI.pptx
@@ -15,6 +15,7 @@
     <p:sldId id="263" r:id="rId9"/>
     <p:sldId id="265" r:id="rId10"/>
     <p:sldId id="264" r:id="rId11"/>
+    <p:sldId id="266" r:id="rId12"/>
   </p:sldIdLst>
   <p:sldSz cx="12192000" cy="6858000"/>
   <p:notesSz cx="6858000" cy="9144000"/>
@@ -3037,6 +3038,36 @@
           </a:p>
         </p:txBody>
       </p:sp>
+      <p:pic>
+        <p:nvPicPr>
+          <p:cNvPr id="5" name="Picture 4"/>
+          <p:cNvPicPr>
+            <a:picLocks noChangeAspect="1"/>
+          </p:cNvPicPr>
+          <p:nvPr/>
+        </p:nvPicPr>
+        <p:blipFill>
+          <a:blip r:embed="rId2">
+            <a:extLst>
+              <a:ext uri="{28A0092B-C50C-407E-A947-70E740481C1C}">
+                <a14:useLocalDpi xmlns:a14="http://schemas.microsoft.com/office/drawing/2010/main" val="0"/>
+              </a:ext>
+            </a:extLst>
+          </a:blip>
+          <a:stretch>
+            <a:fillRect/>
+          </a:stretch>
+        </p:blipFill>
+        <p:spPr>
+          <a:xfrm>
+            <a:off x="10668000" y="5926015"/>
+            <a:ext cx="1476375" cy="698500"/>
+          </a:xfrm>
+          <a:prstGeom prst="rect">
+            <a:avLst/>
+          </a:prstGeom>
+        </p:spPr>
+      </p:pic>
     </p:spTree>
     <p:extLst>
       <p:ext uri="{BB962C8B-B14F-4D97-AF65-F5344CB8AC3E}">
@@ -3098,12 +3129,12 @@
               <a:t>–</a:t>
             </a:r>
             <a:r>
-              <a:rPr lang="en-US" dirty="0" smtClean="0"/>
-              <a:t> Routes the </a:t>
+              <a:rPr lang="en-US" dirty="0"/>
+              <a:t> </a:t>
             </a:r>
             <a:r>
               <a:rPr lang="en-US" dirty="0" err="1" smtClean="0"/>
-              <a:t>Javascript</a:t>
+              <a:t>XMLHttpRequest</a:t>
             </a:r>
             <a:endParaRPr lang="en-US" dirty="0"/>
           </a:p>
@@ -3119,9 +3150,22 @@
             <p:ph idx="1"/>
           </p:nvPr>
         </p:nvSpPr>
-        <p:spPr/>
-        <p:txBody>
-          <a:bodyPr/>
+        <p:spPr>
+          <a:xfrm>
+            <a:off x="838200" y="1825625"/>
+            <a:ext cx="10515600" cy="3012098"/>
+          </a:xfrm>
+          <a:solidFill>
+            <a:schemeClr val="accent1">
+              <a:lumMod val="40000"/>
+              <a:lumOff val="60000"/>
+            </a:schemeClr>
+          </a:solidFill>
+        </p:spPr>
+        <p:txBody>
+          <a:bodyPr>
+            <a:normAutofit fontScale="62500" lnSpcReduction="20000"/>
+          </a:bodyPr>
           <a:lstStyle/>
           <a:p>
             <a:pPr marL="0" indent="0">
@@ -3148,8 +3192,17 @@
               <a:t>XMLHttpRequest</a:t>
             </a:r>
             <a:r>
+              <a:rPr lang="en-US" dirty="0" smtClean="0"/>
+              <a:t>();</a:t>
+            </a:r>
+          </a:p>
+          <a:p>
+            <a:pPr marL="0" indent="0">
+              <a:buNone/>
+            </a:pPr>
+            <a:r>
               <a:rPr lang="en-US" dirty="0"/>
-              <a:t>();</a:t>
+              <a:t/>
             </a:r>
             <a:br>
               <a:rPr lang="en-US" dirty="0"/>
@@ -3183,7 +3236,20 @@
             </a:r>
             <a:r>
               <a:rPr lang="en-US" dirty="0"/>
-              <a:t> == 200) {</a:t>
+              <a:t> == 200) </a:t>
+            </a:r>
+            <a:r>
+              <a:rPr lang="en-US" dirty="0" smtClean="0"/>
+              <a:t>{</a:t>
+            </a:r>
+          </a:p>
+          <a:p>
+            <a:pPr marL="0" indent="0">
+              <a:buNone/>
+            </a:pPr>
+            <a:r>
+              <a:rPr lang="en-US" dirty="0"/>
+              <a:t/>
             </a:r>
             <a:br>
               <a:rPr lang="en-US" dirty="0"/>
@@ -3234,8 +3300,17 @@
               <a:rPr lang="en-US" dirty="0"/>
             </a:br>
             <a:r>
+              <a:rPr lang="en-US" dirty="0" smtClean="0"/>
+              <a:t>};</a:t>
+            </a:r>
+          </a:p>
+          <a:p>
+            <a:pPr marL="0" indent="0">
+              <a:buNone/>
+            </a:pPr>
+            <a:r>
               <a:rPr lang="en-US" dirty="0"/>
-              <a:t>};</a:t>
+              <a:t/>
             </a:r>
             <a:br>
               <a:rPr lang="en-US" dirty="0"/>
@@ -3264,9 +3339,78 @@
               <a:t>xhttp.send</a:t>
             </a:r>
             <a:r>
-              <a:rPr lang="en-US" dirty="0"/>
+              <a:rPr lang="en-US" dirty="0" smtClean="0"/>
               <a:t>();</a:t>
             </a:r>
+          </a:p>
+          <a:p>
+            <a:pPr marL="0" indent="0">
+              <a:buNone/>
+            </a:pPr>
+            <a:endParaRPr lang="en-US" dirty="0"/>
+          </a:p>
+        </p:txBody>
+      </p:sp>
+      <p:pic>
+        <p:nvPicPr>
+          <p:cNvPr id="4" name="Picture 3"/>
+          <p:cNvPicPr>
+            <a:picLocks noChangeAspect="1"/>
+          </p:cNvPicPr>
+          <p:nvPr/>
+        </p:nvPicPr>
+        <p:blipFill>
+          <a:blip r:embed="rId2">
+            <a:extLst>
+              <a:ext uri="{28A0092B-C50C-407E-A947-70E740481C1C}">
+                <a14:useLocalDpi xmlns:a14="http://schemas.microsoft.com/office/drawing/2010/main" val="0"/>
+              </a:ext>
+            </a:extLst>
+          </a:blip>
+          <a:stretch>
+            <a:fillRect/>
+          </a:stretch>
+        </p:blipFill>
+        <p:spPr>
+          <a:xfrm>
+            <a:off x="10668000" y="5926015"/>
+            <a:ext cx="1476375" cy="698500"/>
+          </a:xfrm>
+          <a:prstGeom prst="rect">
+            <a:avLst/>
+          </a:prstGeom>
+        </p:spPr>
+      </p:pic>
+      <p:sp>
+        <p:nvSpPr>
+          <p:cNvPr id="5" name="Rectangle 4"/>
+          <p:cNvSpPr/>
+          <p:nvPr/>
+        </p:nvSpPr>
+        <p:spPr>
+          <a:xfrm>
+            <a:off x="838200" y="4972660"/>
+            <a:ext cx="5373202" cy="369332"/>
+          </a:xfrm>
+          <a:prstGeom prst="rect">
+            <a:avLst/>
+          </a:prstGeom>
+        </p:spPr>
+        <p:txBody>
+          <a:bodyPr wrap="none">
+            <a:spAutoFit/>
+          </a:bodyPr>
+          <a:lstStyle/>
+          <a:p>
+            <a:r>
+              <a:rPr lang="en-US" dirty="0" smtClean="0"/>
+              <a:t>Source: https://www.w3schools.com/xml/</a:t>
+            </a:r>
+            <a:r>
+              <a:rPr lang="en-US" dirty="0" err="1" smtClean="0"/>
+              <a:t>xml_http.asp</a:t>
+            </a:r>
+            <a:endParaRPr lang="en-US" dirty="0"/>
           </a:p>
         </p:txBody>
       </p:sp>
@@ -3280,6 +3424,146 @@
   <p:clrMapOvr>
     <a:masterClrMapping/>
   </p:clrMapOvr>
+  <p:timing>
+    <p:tnLst>
+      <p:par>
+        <p:cTn id="1" dur="indefinite" restart="never" nodeType="tmRoot"/>
+      </p:par>
+    </p:tnLst>
+  </p:timing>
+</p:sld>
+</file>
+
+<file path=ppt/slides/slide11.xml><?xml version="1.0" encoding="utf-8"?>
+<p:sld xmlns:a="http://schemas.openxmlformats.org/drawingml/2006/main" xmlns:r="http://schemas.openxmlformats.org/officeDocument/2006/relationships" xmlns:p="http://schemas.openxmlformats.org/presentationml/2006/main">
+  <p:cSld>
+    <p:spTree>
+      <p:nvGrpSpPr>
+        <p:cNvPr id="1" name=""/>
+        <p:cNvGrpSpPr/>
+        <p:nvPr/>
+      </p:nvGrpSpPr>
+      <p:grpSpPr>
+        <a:xfrm>
+          <a:off x="0" y="0"/>
+          <a:ext cx="0" cy="0"/>
+          <a:chOff x="0" y="0"/>
+          <a:chExt cx="0" cy="0"/>
+        </a:xfrm>
+      </p:grpSpPr>
+      <p:sp>
+        <p:nvSpPr>
+          <p:cNvPr id="2" name="Title 1"/>
+          <p:cNvSpPr>
+            <a:spLocks noGrp="1"/>
+          </p:cNvSpPr>
+          <p:nvPr>
+            <p:ph type="title"/>
+          </p:nvPr>
+        </p:nvSpPr>
+        <p:spPr/>
+        <p:txBody>
+          <a:bodyPr/>
+          <a:lstStyle/>
+          <a:p>
+            <a:r>
+              <a:rPr lang="en-US" dirty="0" smtClean="0"/>
+              <a:t>Playing around with a Test API</a:t>
+            </a:r>
+            <a:endParaRPr lang="en-US" dirty="0"/>
+          </a:p>
+        </p:txBody>
+      </p:sp>
+      <p:sp>
+        <p:nvSpPr>
+          <p:cNvPr id="3" name="Content Placeholder 2"/>
+          <p:cNvSpPr>
+            <a:spLocks noGrp="1"/>
+          </p:cNvSpPr>
+          <p:nvPr>
+            <p:ph idx="1"/>
+          </p:nvPr>
+        </p:nvSpPr>
+        <p:spPr/>
+        <p:txBody>
+          <a:bodyPr/>
+          <a:lstStyle/>
+          <a:p>
+            <a:r>
+              <a:rPr lang="en-US" dirty="0" smtClean="0">
+                <a:hlinkClick r:id="rId2"/>
+              </a:rPr>
+              <a:t>https://jsonplaceholder.typicode.com/</a:t>
+            </a:r>
+            <a:endParaRPr lang="en-US" dirty="0" smtClean="0"/>
+          </a:p>
+          <a:p>
+            <a:pPr marL="0" indent="0">
+              <a:buNone/>
+            </a:pPr>
+            <a:endParaRPr lang="en-US" dirty="0"/>
+          </a:p>
+          <a:p>
+            <a:r>
+              <a:rPr lang="en-US" dirty="0" smtClean="0">
+                <a:hlinkClick r:id="rId3"/>
+              </a:rPr>
+              <a:t>https://chrome.google.com/webstore/detail/postman/fhbjgbiflinjbdggehcddcbncdddomop?hl=en</a:t>
+            </a:r>
+            <a:endParaRPr lang="en-US" dirty="0" smtClean="0"/>
+          </a:p>
+          <a:p>
+            <a:endParaRPr lang="en-US" dirty="0"/>
+          </a:p>
+        </p:txBody>
+      </p:sp>
+      <p:pic>
+        <p:nvPicPr>
+          <p:cNvPr id="4" name="Picture 3"/>
+          <p:cNvPicPr>
+            <a:picLocks noChangeAspect="1"/>
+          </p:cNvPicPr>
+          <p:nvPr/>
+        </p:nvPicPr>
+        <p:blipFill>
+          <a:blip r:embed="rId4">
+            <a:extLst>
+              <a:ext uri="{28A0092B-C50C-407E-A947-70E740481C1C}">
+                <a14:useLocalDpi xmlns:a14="http://schemas.microsoft.com/office/drawing/2010/main" val="0"/>
+              </a:ext>
+            </a:extLst>
+          </a:blip>
+          <a:stretch>
+            <a:fillRect/>
+          </a:stretch>
+        </p:blipFill>
+        <p:spPr>
+          <a:xfrm>
+            <a:off x="10668000" y="5926015"/>
+            <a:ext cx="1476375" cy="698500"/>
+          </a:xfrm>
+          <a:prstGeom prst="rect">
+            <a:avLst/>
+          </a:prstGeom>
+        </p:spPr>
+      </p:pic>
+    </p:spTree>
+    <p:extLst>
+      <p:ext uri="{BB962C8B-B14F-4D97-AF65-F5344CB8AC3E}">
+        <p14:creationId xmlns:p14="http://schemas.microsoft.com/office/powerpoint/2010/main" val="1946268217"/>
+      </p:ext>
+    </p:extLst>
+  </p:cSld>
+  <p:clrMapOvr>
+    <a:masterClrMapping/>
+  </p:clrMapOvr>
+  <p:timing>
+    <p:tnLst>
+      <p:par>
+        <p:cTn id="1" dur="indefinite" restart="never" nodeType="tmRoot"/>
+      </p:par>
+    </p:tnLst>
+  </p:timing>
 </p:sld>
 </file>
 
@@ -3360,6 +3644,36 @@
           </a:p>
         </p:txBody>
       </p:sp>
+      <p:pic>
+        <p:nvPicPr>
+          <p:cNvPr id="4" name="Picture 3"/>
+          <p:cNvPicPr>
+            <a:picLocks noChangeAspect="1"/>
+          </p:cNvPicPr>
+          <p:nvPr/>
+        </p:nvPicPr>
+        <p:blipFill>
+          <a:blip r:embed="rId2">
+            <a:extLst>
+              <a:ext uri="{28A0092B-C50C-407E-A947-70E740481C1C}">
+                <a14:useLocalDpi xmlns:a14="http://schemas.microsoft.com/office/drawing/2010/main" val="0"/>
+              </a:ext>
+            </a:extLst>
+          </a:blip>
+          <a:stretch>
+            <a:fillRect/>
+          </a:stretch>
+        </p:blipFill>
+        <p:spPr>
+          <a:xfrm>
+            <a:off x="10668000" y="5926015"/>
+            <a:ext cx="1476375" cy="698500"/>
+          </a:xfrm>
+          <a:prstGeom prst="rect">
+            <a:avLst/>
+          </a:prstGeom>
+        </p:spPr>
+      </p:pic>
     </p:spTree>
     <p:extLst>
       <p:ext uri="{BB962C8B-B14F-4D97-AF65-F5344CB8AC3E}">
@@ -3370,6 +3684,13 @@
   <p:clrMapOvr>
     <a:masterClrMapping/>
   </p:clrMapOvr>
+  <p:timing>
+    <p:tnLst>
+      <p:par>
+        <p:cTn id="1" dur="indefinite" restart="never" nodeType="tmRoot"/>
+      </p:par>
+    </p:tnLst>
+  </p:timing>
 </p:sld>
 </file>
 
@@ -3426,7 +3747,7 @@
         <p:spPr/>
         <p:txBody>
           <a:bodyPr>
-            <a:normAutofit lnSpcReduction="10000"/>
+            <a:normAutofit/>
           </a:bodyPr>
           <a:lstStyle/>
           <a:p>
@@ -3504,22 +3825,22 @@
               <a:buNone/>
             </a:pPr>
             <a:r>
-              <a:rPr lang="en-US" dirty="0" smtClean="0"/>
-              <a:t>Full Python list API: https://</a:t>
-            </a:r>
-            <a:r>
-              <a:rPr lang="en-US" dirty="0" err="1" smtClean="0"/>
-              <a:t>docs.python.org</a:t>
-            </a:r>
-            <a:r>
-              <a:rPr lang="en-US" dirty="0" smtClean="0"/>
-              <a:t>/2/tutorial/</a:t>
-            </a:r>
-            <a:r>
-              <a:rPr lang="en-US" dirty="0" err="1" smtClean="0"/>
-              <a:t>datastructures.html</a:t>
-            </a:r>
-            <a:endParaRPr lang="en-US" dirty="0" smtClean="0"/>
+              <a:rPr lang="en-US" sz="2000" dirty="0" smtClean="0"/>
+              <a:t>Full Python list API: </a:t>
+            </a:r>
+            <a:r>
+              <a:rPr lang="en-US" sz="2000" dirty="0" smtClean="0">
+                <a:hlinkClick r:id="rId2"/>
+              </a:rPr>
+              <a:t>https://docs.python.org/2/tutorial/datastructures.html</a:t>
+            </a:r>
+            <a:endParaRPr lang="en-US" sz="2000" dirty="0" smtClean="0"/>
+          </a:p>
+          <a:p>
+            <a:pPr marL="0" indent="0">
+              <a:buNone/>
+            </a:pPr>
+            <a:endParaRPr lang="en-US" sz="2000" dirty="0" smtClean="0"/>
           </a:p>
           <a:p>
             <a:pPr marL="0" indent="0">
@@ -3529,6 +3850,36 @@
           </a:p>
         </p:txBody>
       </p:sp>
+      <p:pic>
+        <p:nvPicPr>
+          <p:cNvPr id="4" name="Picture 3"/>
+          <p:cNvPicPr>
+            <a:picLocks noChangeAspect="1"/>
+          </p:cNvPicPr>
+          <p:nvPr/>
+        </p:nvPicPr>
+        <p:blipFill>
+          <a:blip r:embed="rId3">
+            <a:extLst>
+              <a:ext uri="{28A0092B-C50C-407E-A947-70E740481C1C}">
+                <a14:useLocalDpi xmlns:a14="http://schemas.microsoft.com/office/drawing/2010/main" val="0"/>
+              </a:ext>
+            </a:extLst>
+          </a:blip>
+          <a:stretch>
+            <a:fillRect/>
+          </a:stretch>
+        </p:blipFill>
+        <p:spPr>
+          <a:xfrm>
+            <a:off x="10668000" y="5926015"/>
+            <a:ext cx="1476375" cy="698500"/>
+          </a:xfrm>
+          <a:prstGeom prst="rect">
+            <a:avLst/>
+          </a:prstGeom>
+        </p:spPr>
+      </p:pic>
     </p:spTree>
     <p:extLst>
       <p:ext uri="{BB962C8B-B14F-4D97-AF65-F5344CB8AC3E}">
@@ -3539,6 +3890,13 @@
   <p:clrMapOvr>
     <a:masterClrMapping/>
   </p:clrMapOvr>
+  <p:timing>
+    <p:tnLst>
+      <p:par>
+        <p:cTn id="1" dur="indefinite" restart="never" nodeType="tmRoot"/>
+      </p:par>
+    </p:tnLst>
+  </p:timing>
 </p:sld>
 </file>
 
@@ -3605,13 +3963,19 @@
           <a:p>
             <a:r>
               <a:rPr lang="en-US" dirty="0" smtClean="0"/>
-              <a:t>With your API inputs and output well defined, the end-user developer does not need (and should not) need to know how the API action is implemented in order to use it. </a:t>
-            </a:r>
-          </a:p>
-          <a:p>
-            <a:r>
-              <a:rPr lang="en-US" dirty="0" smtClean="0"/>
-              <a:t>They can hopefully assume the logic is optimized for the </a:t>
+              <a:t>The end-user developer does not need (and should not) need to know how the API action is implemented in order to use it. </a:t>
+            </a:r>
+          </a:p>
+          <a:p>
+            <a:endParaRPr lang="en-US" dirty="0" smtClean="0"/>
+          </a:p>
+          <a:p>
+            <a:endParaRPr lang="en-US" dirty="0"/>
+          </a:p>
+          <a:p>
+            <a:r>
+              <a:rPr lang="en-US" dirty="0" smtClean="0"/>
+              <a:t>They can assume the logic is optimized for the </a:t>
             </a:r>
             <a:r>
               <a:rPr lang="en-US" dirty="0" err="1" smtClean="0"/>
@@ -3631,6 +3995,36 @@
           </a:p>
         </p:txBody>
       </p:sp>
+      <p:pic>
+        <p:nvPicPr>
+          <p:cNvPr id="4" name="Picture 3"/>
+          <p:cNvPicPr>
+            <a:picLocks noChangeAspect="1"/>
+          </p:cNvPicPr>
+          <p:nvPr/>
+        </p:nvPicPr>
+        <p:blipFill>
+          <a:blip r:embed="rId2">
+            <a:extLst>
+              <a:ext uri="{28A0092B-C50C-407E-A947-70E740481C1C}">
+                <a14:useLocalDpi xmlns:a14="http://schemas.microsoft.com/office/drawing/2010/main" val="0"/>
+              </a:ext>
+            </a:extLst>
+          </a:blip>
+          <a:stretch>
+            <a:fillRect/>
+          </a:stretch>
+        </p:blipFill>
+        <p:spPr>
+          <a:xfrm>
+            <a:off x="10668000" y="5926015"/>
+            <a:ext cx="1476375" cy="698500"/>
+          </a:xfrm>
+          <a:prstGeom prst="rect">
+            <a:avLst/>
+          </a:prstGeom>
+        </p:spPr>
+      </p:pic>
     </p:spTree>
     <p:extLst>
       <p:ext uri="{BB962C8B-B14F-4D97-AF65-F5344CB8AC3E}">
@@ -3641,6 +4035,13 @@
   <p:clrMapOvr>
     <a:masterClrMapping/>
   </p:clrMapOvr>
+  <p:timing>
+    <p:tnLst>
+      <p:par>
+        <p:cTn id="1" dur="indefinite" restart="never" nodeType="tmRoot"/>
+      </p:par>
+    </p:tnLst>
+  </p:timing>
 </p:sld>
 </file>
 
@@ -3709,26 +4110,65 @@
           <a:p>
             <a:r>
               <a:rPr lang="en-US" dirty="0" smtClean="0"/>
-              <a:t>With your API well defined, the maintainer should be able to swap out the implementation logic without the end-users knowing a change has occurred (apart from optimizations). The input parameters, the output, and the </a:t>
+              <a:t>As an API maintainer:</a:t>
+            </a:r>
+          </a:p>
+          <a:p>
+            <a:pPr lvl="1"/>
+            <a:r>
+              <a:rPr lang="en-US" dirty="0" smtClean="0"/>
+              <a:t>You should be able to swap out the implementation logic without breaking dependencies—the API is the one </a:t>
             </a:r>
             <a:r>
               <a:rPr lang="en-US" dirty="0" err="1" smtClean="0"/>
-              <a:t>behaviour</a:t>
-            </a:r>
-            <a:r>
-              <a:rPr lang="en-US" dirty="0" smtClean="0"/>
-              <a:t> should remain the same.</a:t>
-            </a:r>
-          </a:p>
-          <a:p>
-            <a:r>
-              <a:rPr lang="en-US" dirty="0" smtClean="0"/>
-              <a:t>If you change your API, you will break the code of the developers that consume it! This change would likely mean a new version of the API that developers would need to onboard.</a:t>
+              <a:t>consistant</a:t>
+            </a:r>
+            <a:r>
+              <a:rPr lang="en-US" dirty="0" smtClean="0"/>
+              <a:t> part of your design. </a:t>
             </a:r>
             <a:endParaRPr lang="en-US" dirty="0"/>
           </a:p>
-        </p:txBody>
-      </p:sp>
+          <a:p>
+            <a:pPr lvl="1"/>
+            <a:r>
+              <a:rPr lang="en-US" dirty="0" smtClean="0"/>
+              <a:t>Any changes to the API itself will break dependencies that consume it! This change would likely mean you need to create a new version of the API.</a:t>
+            </a:r>
+            <a:endParaRPr lang="en-US" dirty="0"/>
+          </a:p>
+        </p:txBody>
+      </p:sp>
+      <p:pic>
+        <p:nvPicPr>
+          <p:cNvPr id="4" name="Picture 3"/>
+          <p:cNvPicPr>
+            <a:picLocks noChangeAspect="1"/>
+          </p:cNvPicPr>
+          <p:nvPr/>
+        </p:nvPicPr>
+        <p:blipFill>
+          <a:blip r:embed="rId2">
+            <a:extLst>
+              <a:ext uri="{28A0092B-C50C-407E-A947-70E740481C1C}">
+                <a14:useLocalDpi xmlns:a14="http://schemas.microsoft.com/office/drawing/2010/main" val="0"/>
+              </a:ext>
+            </a:extLst>
+          </a:blip>
+          <a:stretch>
+            <a:fillRect/>
+          </a:stretch>
+        </p:blipFill>
+        <p:spPr>
+          <a:xfrm>
+            <a:off x="10668000" y="5926015"/>
+            <a:ext cx="1476375" cy="698500"/>
+          </a:xfrm>
+          <a:prstGeom prst="rect">
+            <a:avLst/>
+          </a:prstGeom>
+        </p:spPr>
+      </p:pic>
     </p:spTree>
     <p:extLst>
       <p:ext uri="{BB962C8B-B14F-4D97-AF65-F5344CB8AC3E}">
@@ -3739,6 +4179,13 @@
   <p:clrMapOvr>
     <a:masterClrMapping/>
   </p:clrMapOvr>
+  <p:timing>
+    <p:tnLst>
+      <p:par>
+        <p:cTn id="1" dur="indefinite" restart="never" nodeType="tmRoot"/>
+      </p:par>
+    </p:tnLst>
+  </p:timing>
 </p:sld>
 </file>
 
@@ -3835,6 +4282,36 @@
           </a:p>
         </p:txBody>
       </p:sp>
+      <p:pic>
+        <p:nvPicPr>
+          <p:cNvPr id="4" name="Picture 3"/>
+          <p:cNvPicPr>
+            <a:picLocks noChangeAspect="1"/>
+          </p:cNvPicPr>
+          <p:nvPr/>
+        </p:nvPicPr>
+        <p:blipFill>
+          <a:blip r:embed="rId2">
+            <a:extLst>
+              <a:ext uri="{28A0092B-C50C-407E-A947-70E740481C1C}">
+                <a14:useLocalDpi xmlns:a14="http://schemas.microsoft.com/office/drawing/2010/main" val="0"/>
+              </a:ext>
+            </a:extLst>
+          </a:blip>
+          <a:stretch>
+            <a:fillRect/>
+          </a:stretch>
+        </p:blipFill>
+        <p:spPr>
+          <a:xfrm>
+            <a:off x="10668000" y="5926015"/>
+            <a:ext cx="1476375" cy="698500"/>
+          </a:xfrm>
+          <a:prstGeom prst="rect">
+            <a:avLst/>
+          </a:prstGeom>
+        </p:spPr>
+      </p:pic>
     </p:spTree>
     <p:extLst>
       <p:ext uri="{BB962C8B-B14F-4D97-AF65-F5344CB8AC3E}">
@@ -3845,6 +4322,13 @@
   <p:clrMapOvr>
     <a:masterClrMapping/>
   </p:clrMapOvr>
+  <p:timing>
+    <p:tnLst>
+      <p:par>
+        <p:cTn id="1" dur="indefinite" restart="never" nodeType="tmRoot"/>
+      </p:par>
+    </p:tnLst>
+  </p:timing>
 </p:sld>
 </file>
 
@@ -3920,7 +4404,7 @@
             </a:r>
             <a:r>
               <a:rPr lang="en-US" dirty="0" smtClean="0"/>
-              <a:t>. CRUD maps to the following HTTP  that one would use in an AJAX call:</a:t>
+              <a:t>. CRUD maps to the following HTTP methods that one would use in an AJAX call:</a:t>
             </a:r>
             <a:endParaRPr lang="en-US" dirty="0"/>
           </a:p>
@@ -3931,7 +4415,7 @@
             </a:pPr>
             <a:r>
               <a:rPr lang="en-US" dirty="0" smtClean="0"/>
-              <a:t>Create: Put/Post</a:t>
+              <a:t>Create -&gt; Put/Post</a:t>
             </a:r>
           </a:p>
           <a:p>
@@ -3941,7 +4425,7 @@
             </a:pPr>
             <a:r>
               <a:rPr lang="en-US" dirty="0" smtClean="0"/>
-              <a:t>Read: Get</a:t>
+              <a:t>Read -&gt; Get</a:t>
             </a:r>
           </a:p>
           <a:p>
@@ -3951,7 +4435,7 @@
             </a:pPr>
             <a:r>
               <a:rPr lang="en-US" dirty="0" smtClean="0"/>
-              <a:t>Update: Put/Post/Patch</a:t>
+              <a:t>Update -&gt; Put/Post/Patch</a:t>
             </a:r>
           </a:p>
           <a:p>
@@ -3961,13 +4445,13 @@
             </a:pPr>
             <a:r>
               <a:rPr lang="en-US" dirty="0" smtClean="0"/>
-              <a:t>Delete: Delete</a:t>
-            </a:r>
-          </a:p>
-          <a:p>
-            <a:r>
-              <a:rPr lang="en-US" dirty="0" smtClean="0"/>
-              <a:t>Generally follow a path of general to specific requirements</a:t>
+              <a:t>Delete -&gt; Delete</a:t>
+            </a:r>
+          </a:p>
+          <a:p>
+            <a:r>
+              <a:rPr lang="en-US" dirty="0" smtClean="0"/>
+              <a:t>Generally follows how your data is encapsulated</a:t>
             </a:r>
           </a:p>
           <a:p>
@@ -3975,6 +4459,36 @@
           </a:p>
         </p:txBody>
       </p:sp>
+      <p:pic>
+        <p:nvPicPr>
+          <p:cNvPr id="4" name="Picture 3"/>
+          <p:cNvPicPr>
+            <a:picLocks noChangeAspect="1"/>
+          </p:cNvPicPr>
+          <p:nvPr/>
+        </p:nvPicPr>
+        <p:blipFill>
+          <a:blip r:embed="rId2">
+            <a:extLst>
+              <a:ext uri="{28A0092B-C50C-407E-A947-70E740481C1C}">
+                <a14:useLocalDpi xmlns:a14="http://schemas.microsoft.com/office/drawing/2010/main" val="0"/>
+              </a:ext>
+            </a:extLst>
+          </a:blip>
+          <a:stretch>
+            <a:fillRect/>
+          </a:stretch>
+        </p:blipFill>
+        <p:spPr>
+          <a:xfrm>
+            <a:off x="10668000" y="5926015"/>
+            <a:ext cx="1476375" cy="698500"/>
+          </a:xfrm>
+          <a:prstGeom prst="rect">
+            <a:avLst/>
+          </a:prstGeom>
+        </p:spPr>
+      </p:pic>
     </p:spTree>
     <p:extLst>
       <p:ext uri="{BB962C8B-B14F-4D97-AF65-F5344CB8AC3E}">
@@ -3985,6 +4499,13 @@
   <p:clrMapOvr>
     <a:masterClrMapping/>
   </p:clrMapOvr>
+  <p:timing>
+    <p:tnLst>
+      <p:par>
+        <p:cTn id="1" dur="indefinite" restart="never" nodeType="tmRoot"/>
+      </p:par>
+    </p:tnLst>
+  </p:timing>
 </p:sld>
 </file>
 
@@ -4371,6 +4892,36 @@
           </a:p>
         </p:txBody>
       </p:sp>
+      <p:pic>
+        <p:nvPicPr>
+          <p:cNvPr id="4" name="Picture 3"/>
+          <p:cNvPicPr>
+            <a:picLocks noChangeAspect="1"/>
+          </p:cNvPicPr>
+          <p:nvPr/>
+        </p:nvPicPr>
+        <p:blipFill>
+          <a:blip r:embed="rId2">
+            <a:extLst>
+              <a:ext uri="{28A0092B-C50C-407E-A947-70E740481C1C}">
+                <a14:useLocalDpi xmlns:a14="http://schemas.microsoft.com/office/drawing/2010/main" val="0"/>
+              </a:ext>
+            </a:extLst>
+          </a:blip>
+          <a:stretch>
+            <a:fillRect/>
+          </a:stretch>
+        </p:blipFill>
+        <p:spPr>
+          <a:xfrm>
+            <a:off x="10668000" y="5926015"/>
+            <a:ext cx="1476375" cy="698500"/>
+          </a:xfrm>
+          <a:prstGeom prst="rect">
+            <a:avLst/>
+          </a:prstGeom>
+        </p:spPr>
+      </p:pic>
     </p:spTree>
     <p:extLst>
       <p:ext uri="{BB962C8B-B14F-4D97-AF65-F5344CB8AC3E}">
@@ -4381,6 +4932,13 @@
   <p:clrMapOvr>
     <a:masterClrMapping/>
   </p:clrMapOvr>
+  <p:timing>
+    <p:tnLst>
+      <p:par>
+        <p:cTn id="1" dur="indefinite" restart="never" nodeType="tmRoot"/>
+      </p:par>
+    </p:tnLst>
+  </p:timing>
 </p:sld>
 </file>
 
@@ -4451,10 +5009,137 @@
           <a:bodyPr/>
           <a:lstStyle/>
           <a:p>
-            <a:endParaRPr lang="en-US"/>
-          </a:p>
-        </p:txBody>
-      </p:sp>
+            <a:r>
+              <a:rPr lang="en-US" dirty="0" smtClean="0"/>
+              <a:t>Data is typically handled in JSON (</a:t>
+            </a:r>
+            <a:r>
+              <a:rPr lang="en-US" dirty="0" err="1" smtClean="0"/>
+              <a:t>Javascript</a:t>
+            </a:r>
+            <a:r>
+              <a:rPr lang="en-US" dirty="0" smtClean="0"/>
+              <a:t> Object Notation)</a:t>
+            </a:r>
+          </a:p>
+          <a:p>
+            <a:r>
+              <a:rPr lang="en-US" dirty="0" smtClean="0"/>
+              <a:t>Must be documented and </a:t>
+            </a:r>
+            <a:r>
+              <a:rPr lang="en-US" dirty="0" err="1" smtClean="0"/>
+              <a:t>consistant</a:t>
+            </a:r>
+            <a:endParaRPr lang="en-US" dirty="0" smtClean="0"/>
+          </a:p>
+          <a:p>
+            <a:r>
+              <a:rPr lang="en-US" dirty="0" smtClean="0"/>
+              <a:t>Input parameters can be passed via the URL or sent as formatted JSON</a:t>
+            </a:r>
+            <a:br>
+              <a:rPr lang="en-US" dirty="0" smtClean="0"/>
+            </a:br>
+            <a:r>
+              <a:rPr lang="en-US" dirty="0" smtClean="0"/>
+              <a:t>https://somesite/api/v1/someaction</a:t>
+            </a:r>
+            <a:r>
+              <a:rPr lang="en-US" dirty="0" smtClean="0">
+                <a:solidFill>
+                  <a:srgbClr val="FF0000"/>
+                </a:solidFill>
+              </a:rPr>
+              <a:t>?</a:t>
+            </a:r>
+            <a:r>
+              <a:rPr lang="en-US" dirty="0" smtClean="0">
+                <a:solidFill>
+                  <a:schemeClr val="accent1">
+                    <a:lumMod val="50000"/>
+                  </a:schemeClr>
+                </a:solidFill>
+              </a:rPr>
+              <a:t>param1=first</a:t>
+            </a:r>
+            <a:r>
+              <a:rPr lang="en-US" dirty="0" smtClean="0">
+                <a:solidFill>
+                  <a:srgbClr val="FF0000"/>
+                </a:solidFill>
+              </a:rPr>
+              <a:t>&amp;</a:t>
+            </a:r>
+            <a:r>
+              <a:rPr lang="en-US" dirty="0" smtClean="0">
+                <a:solidFill>
+                  <a:schemeClr val="accent6">
+                    <a:lumMod val="50000"/>
+                  </a:schemeClr>
+                </a:solidFill>
+              </a:rPr>
+              <a:t>param2=second</a:t>
+            </a:r>
+            <a:endParaRPr lang="en-US" dirty="0">
+              <a:solidFill>
+                <a:srgbClr val="FF0000"/>
+              </a:solidFill>
+            </a:endParaRPr>
+          </a:p>
+          <a:p>
+            <a:pPr lvl="1"/>
+            <a:r>
+              <a:rPr lang="en-US" dirty="0" smtClean="0"/>
+              <a:t>both are secure ways of </a:t>
+            </a:r>
+            <a:r>
+              <a:rPr lang="en-US" dirty="0" err="1" smtClean="0"/>
+              <a:t>transfering</a:t>
+            </a:r>
+            <a:r>
+              <a:rPr lang="en-US" dirty="0" smtClean="0"/>
+              <a:t> data assuming your connection is SSL encrypted. Without SSL, this data is sent as clear text that can be sniffed.</a:t>
+            </a:r>
+          </a:p>
+          <a:p>
+            <a:pPr marL="0" indent="0">
+              <a:buNone/>
+            </a:pPr>
+            <a:endParaRPr lang="en-US" dirty="0"/>
+          </a:p>
+        </p:txBody>
+      </p:sp>
+      <p:pic>
+        <p:nvPicPr>
+          <p:cNvPr id="4" name="Picture 3"/>
+          <p:cNvPicPr>
+            <a:picLocks noChangeAspect="1"/>
+          </p:cNvPicPr>
+          <p:nvPr/>
+        </p:nvPicPr>
+        <p:blipFill>
+          <a:blip r:embed="rId2">
+            <a:extLst>
+              <a:ext uri="{28A0092B-C50C-407E-A947-70E740481C1C}">
+                <a14:useLocalDpi xmlns:a14="http://schemas.microsoft.com/office/drawing/2010/main" val="0"/>
+              </a:ext>
+            </a:extLst>
+          </a:blip>
+          <a:stretch>
+            <a:fillRect/>
+          </a:stretch>
+        </p:blipFill>
+        <p:spPr>
+          <a:xfrm>
+            <a:off x="10668000" y="5926015"/>
+            <a:ext cx="1476375" cy="698500"/>
+          </a:xfrm>
+          <a:prstGeom prst="rect">
+            <a:avLst/>
+          </a:prstGeom>
+        </p:spPr>
+      </p:pic>
     </p:spTree>
     <p:extLst>
       <p:ext uri="{BB962C8B-B14F-4D97-AF65-F5344CB8AC3E}">
@@ -4465,6 +5150,13 @@
   <p:clrMapOvr>
     <a:masterClrMapping/>
   </p:clrMapOvr>
+  <p:timing>
+    <p:tnLst>
+      <p:par>
+        <p:cTn id="1" dur="indefinite" restart="never" nodeType="tmRoot"/>
+      </p:par>
+    </p:tnLst>
+  </p:timing>
 </p:sld>
 </file>
 

</xml_diff>

<commit_message>
Better clarification on stuff
</commit_message>
<xml_diff>
--- a/IntroductionAPI/ProgrammingAPI.pptx
+++ b/IntroductionAPI/ProgrammingAPI.pptx
@@ -12,10 +12,11 @@
     <p:sldId id="260" r:id="rId6"/>
     <p:sldId id="261" r:id="rId7"/>
     <p:sldId id="262" r:id="rId8"/>
-    <p:sldId id="263" r:id="rId9"/>
-    <p:sldId id="265" r:id="rId10"/>
-    <p:sldId id="264" r:id="rId11"/>
-    <p:sldId id="266" r:id="rId12"/>
+    <p:sldId id="265" r:id="rId9"/>
+    <p:sldId id="267" r:id="rId10"/>
+    <p:sldId id="263" r:id="rId11"/>
+    <p:sldId id="264" r:id="rId12"/>
+    <p:sldId id="266" r:id="rId13"/>
   </p:sldIdLst>
   <p:sldSz cx="12192000" cy="6858000"/>
   <p:notesSz cx="6858000" cy="9144000"/>
@@ -3122,232 +3123,352 @@
           <a:p>
             <a:r>
               <a:rPr lang="en-US" dirty="0" smtClean="0"/>
-              <a:t>Web API </a:t>
-            </a:r>
-            <a:r>
-              <a:rPr lang="mr-IN" dirty="0" smtClean="0"/>
-              <a:t>–</a:t>
-            </a:r>
-            <a:r>
-              <a:rPr lang="en-US" dirty="0"/>
-              <a:t> </a:t>
+              <a:t>Web API - Routes for Lists</a:t>
+            </a:r>
+            <a:endParaRPr lang="en-US" dirty="0"/>
+          </a:p>
+        </p:txBody>
+      </p:sp>
+      <p:sp>
+        <p:nvSpPr>
+          <p:cNvPr id="3" name="Content Placeholder 2"/>
+          <p:cNvSpPr>
+            <a:spLocks noGrp="1"/>
+          </p:cNvSpPr>
+          <p:nvPr>
+            <p:ph idx="1"/>
+          </p:nvPr>
+        </p:nvSpPr>
+        <p:spPr/>
+        <p:txBody>
+          <a:bodyPr>
+            <a:normAutofit/>
+          </a:bodyPr>
+          <a:lstStyle/>
+          <a:p>
+            <a:r>
+              <a:rPr lang="en-US" dirty="0" smtClean="0"/>
+              <a:t>Suppose we have a web service that people can use to create personal lists:</a:t>
+            </a:r>
+          </a:p>
+          <a:p>
+            <a:pPr lvl="1"/>
+            <a:r>
+              <a:rPr lang="en-US" dirty="0" smtClean="0"/>
+              <a:t>Get all/Create a lists for a user: </a:t>
+            </a:r>
+            <a:br>
+              <a:rPr lang="en-US" dirty="0" smtClean="0"/>
+            </a:br>
+            <a:r>
+              <a:rPr lang="en-US" dirty="0" smtClean="0"/>
+              <a:t>    </a:t>
             </a:r>
             <a:r>
               <a:rPr lang="en-US" dirty="0" err="1" smtClean="0"/>
-              <a:t>XMLHttpRequest</a:t>
+              <a:t>mylists.com</a:t>
+            </a:r>
+            <a:r>
+              <a:rPr lang="en-US" dirty="0" smtClean="0">
+                <a:solidFill>
+                  <a:srgbClr val="FF0000"/>
+                </a:solidFill>
+              </a:rPr>
+              <a:t>/</a:t>
+            </a:r>
+            <a:r>
+              <a:rPr lang="en-US" dirty="0" err="1" smtClean="0">
+                <a:solidFill>
+                  <a:srgbClr val="FF0000"/>
+                </a:solidFill>
+              </a:rPr>
+              <a:t>api</a:t>
+            </a:r>
+            <a:r>
+              <a:rPr lang="en-US" dirty="0" smtClean="0">
+                <a:solidFill>
+                  <a:srgbClr val="FF0000"/>
+                </a:solidFill>
+              </a:rPr>
+              <a:t>/v1</a:t>
+            </a:r>
+            <a:r>
+              <a:rPr lang="en-US" dirty="0" smtClean="0"/>
+              <a:t>/</a:t>
+            </a:r>
+            <a:r>
+              <a:rPr lang="en-US" dirty="0" smtClean="0">
+                <a:solidFill>
+                  <a:schemeClr val="accent1">
+                    <a:lumMod val="75000"/>
+                  </a:schemeClr>
+                </a:solidFill>
+              </a:rPr>
+              <a:t>users/derrick</a:t>
+            </a:r>
+            <a:r>
+              <a:rPr lang="en-US" dirty="0" smtClean="0"/>
+              <a:t>/</a:t>
+            </a:r>
+            <a:r>
+              <a:rPr lang="en-US" dirty="0" smtClean="0">
+                <a:solidFill>
+                  <a:srgbClr val="00B050"/>
+                </a:solidFill>
+              </a:rPr>
+              <a:t>lists</a:t>
+            </a:r>
+            <a:endParaRPr lang="en-US" dirty="0" smtClean="0"/>
+          </a:p>
+          <a:p>
+            <a:pPr lvl="1"/>
+            <a:r>
+              <a:rPr lang="en-US" dirty="0" smtClean="0"/>
+              <a:t>Get/Update a specific list for a user: </a:t>
+            </a:r>
+            <a:br>
+              <a:rPr lang="en-US" dirty="0" smtClean="0"/>
+            </a:br>
+            <a:r>
+              <a:rPr lang="en-US" dirty="0" smtClean="0"/>
+              <a:t>    </a:t>
+            </a:r>
+            <a:r>
+              <a:rPr lang="en-US" dirty="0" err="1" smtClean="0"/>
+              <a:t>mylists.com</a:t>
+            </a:r>
+            <a:r>
+              <a:rPr lang="en-US" dirty="0" smtClean="0">
+                <a:solidFill>
+                  <a:srgbClr val="FF0000"/>
+                </a:solidFill>
+              </a:rPr>
+              <a:t>/</a:t>
+            </a:r>
+            <a:r>
+              <a:rPr lang="en-US" dirty="0" err="1" smtClean="0">
+                <a:solidFill>
+                  <a:srgbClr val="FF0000"/>
+                </a:solidFill>
+              </a:rPr>
+              <a:t>api</a:t>
+            </a:r>
+            <a:r>
+              <a:rPr lang="en-US" dirty="0" smtClean="0">
+                <a:solidFill>
+                  <a:srgbClr val="FF0000"/>
+                </a:solidFill>
+              </a:rPr>
+              <a:t>/v1</a:t>
+            </a:r>
+            <a:r>
+              <a:rPr lang="en-US" dirty="0" smtClean="0"/>
+              <a:t>/</a:t>
+            </a:r>
+            <a:r>
+              <a:rPr lang="en-US" dirty="0" smtClean="0">
+                <a:solidFill>
+                  <a:schemeClr val="accent1">
+                    <a:lumMod val="75000"/>
+                  </a:schemeClr>
+                </a:solidFill>
+              </a:rPr>
+              <a:t>users/derrick</a:t>
+            </a:r>
+            <a:r>
+              <a:rPr lang="en-US" dirty="0" smtClean="0"/>
+              <a:t>/</a:t>
+            </a:r>
+            <a:r>
+              <a:rPr lang="en-US" dirty="0" smtClean="0">
+                <a:solidFill>
+                  <a:srgbClr val="00B050"/>
+                </a:solidFill>
+              </a:rPr>
+              <a:t>lists/1</a:t>
+            </a:r>
+            <a:endParaRPr lang="en-US" dirty="0" smtClean="0"/>
+          </a:p>
+          <a:p>
+            <a:pPr lvl="1"/>
+            <a:r>
+              <a:rPr lang="en-US" dirty="0" smtClean="0"/>
+              <a:t>Get all/Add items from a list from a user:</a:t>
+            </a:r>
+            <a:br>
+              <a:rPr lang="en-US" dirty="0" smtClean="0"/>
+            </a:br>
+            <a:r>
+              <a:rPr lang="en-US" dirty="0" smtClean="0"/>
+              <a:t>    </a:t>
+            </a:r>
+            <a:r>
+              <a:rPr lang="en-US" dirty="0" err="1" smtClean="0"/>
+              <a:t>mylists.com</a:t>
+            </a:r>
+            <a:r>
+              <a:rPr lang="en-US" dirty="0" smtClean="0">
+                <a:solidFill>
+                  <a:srgbClr val="FF0000"/>
+                </a:solidFill>
+              </a:rPr>
+              <a:t>/</a:t>
+            </a:r>
+            <a:r>
+              <a:rPr lang="en-US" dirty="0" err="1" smtClean="0">
+                <a:solidFill>
+                  <a:srgbClr val="FF0000"/>
+                </a:solidFill>
+              </a:rPr>
+              <a:t>api</a:t>
+            </a:r>
+            <a:r>
+              <a:rPr lang="en-US" dirty="0" smtClean="0">
+                <a:solidFill>
+                  <a:srgbClr val="FF0000"/>
+                </a:solidFill>
+              </a:rPr>
+              <a:t>/v1</a:t>
+            </a:r>
+            <a:r>
+              <a:rPr lang="en-US" dirty="0" smtClean="0"/>
+              <a:t>/</a:t>
+            </a:r>
+            <a:r>
+              <a:rPr lang="en-US" dirty="0" smtClean="0">
+                <a:solidFill>
+                  <a:schemeClr val="accent1">
+                    <a:lumMod val="75000"/>
+                  </a:schemeClr>
+                </a:solidFill>
+              </a:rPr>
+              <a:t>users/derrick</a:t>
+            </a:r>
+            <a:r>
+              <a:rPr lang="en-US" dirty="0" smtClean="0"/>
+              <a:t>/</a:t>
+            </a:r>
+            <a:r>
+              <a:rPr lang="en-US" dirty="0" smtClean="0">
+                <a:solidFill>
+                  <a:srgbClr val="00B050"/>
+                </a:solidFill>
+              </a:rPr>
+              <a:t>lists/1</a:t>
+            </a:r>
+            <a:r>
+              <a:rPr lang="en-US" dirty="0" smtClean="0"/>
+              <a:t>/</a:t>
+            </a:r>
+            <a:r>
+              <a:rPr lang="en-US" dirty="0" smtClean="0">
+                <a:solidFill>
+                  <a:schemeClr val="accent2"/>
+                </a:solidFill>
+              </a:rPr>
+              <a:t>items</a:t>
+            </a:r>
+          </a:p>
+          <a:p>
+            <a:pPr lvl="1"/>
+            <a:r>
+              <a:rPr lang="en-US" dirty="0" smtClean="0"/>
+              <a:t>Get/Delete/Update a specific item from a list from a user:</a:t>
+            </a:r>
+            <a:br>
+              <a:rPr lang="en-US" dirty="0" smtClean="0"/>
+            </a:br>
+            <a:r>
+              <a:rPr lang="en-US" dirty="0" smtClean="0"/>
+              <a:t>    </a:t>
+            </a:r>
+            <a:r>
+              <a:rPr lang="en-US" dirty="0" err="1" smtClean="0"/>
+              <a:t>mylists.com</a:t>
+            </a:r>
+            <a:r>
+              <a:rPr lang="en-US" dirty="0" smtClean="0">
+                <a:solidFill>
+                  <a:srgbClr val="FF0000"/>
+                </a:solidFill>
+              </a:rPr>
+              <a:t>/</a:t>
+            </a:r>
+            <a:r>
+              <a:rPr lang="en-US" dirty="0" err="1" smtClean="0">
+                <a:solidFill>
+                  <a:srgbClr val="FF0000"/>
+                </a:solidFill>
+              </a:rPr>
+              <a:t>api</a:t>
+            </a:r>
+            <a:r>
+              <a:rPr lang="en-US" dirty="0" smtClean="0">
+                <a:solidFill>
+                  <a:srgbClr val="FF0000"/>
+                </a:solidFill>
+              </a:rPr>
+              <a:t>/v1</a:t>
+            </a:r>
+            <a:r>
+              <a:rPr lang="en-US" dirty="0" smtClean="0"/>
+              <a:t>/</a:t>
+            </a:r>
+            <a:r>
+              <a:rPr lang="en-US" dirty="0" smtClean="0">
+                <a:solidFill>
+                  <a:schemeClr val="accent1">
+                    <a:lumMod val="75000"/>
+                  </a:schemeClr>
+                </a:solidFill>
+              </a:rPr>
+              <a:t>users/derrick</a:t>
+            </a:r>
+            <a:r>
+              <a:rPr lang="en-US" dirty="0" smtClean="0"/>
+              <a:t>/</a:t>
+            </a:r>
+            <a:r>
+              <a:rPr lang="en-US" dirty="0" smtClean="0">
+                <a:solidFill>
+                  <a:srgbClr val="00B050"/>
+                </a:solidFill>
+              </a:rPr>
+              <a:t>lists/1</a:t>
+            </a:r>
+            <a:r>
+              <a:rPr lang="en-US" dirty="0" smtClean="0"/>
+              <a:t>/</a:t>
+            </a:r>
+            <a:r>
+              <a:rPr lang="en-US" dirty="0" smtClean="0">
+                <a:solidFill>
+                  <a:schemeClr val="accent2"/>
+                </a:solidFill>
+              </a:rPr>
+              <a:t>items/1</a:t>
             </a:r>
             <a:endParaRPr lang="en-US" dirty="0"/>
           </a:p>
-        </p:txBody>
-      </p:sp>
-      <p:sp>
-        <p:nvSpPr>
-          <p:cNvPr id="3" name="Content Placeholder 2"/>
-          <p:cNvSpPr>
-            <a:spLocks noGrp="1"/>
-          </p:cNvSpPr>
-          <p:nvPr>
-            <p:ph idx="1"/>
-          </p:nvPr>
-        </p:nvSpPr>
-        <p:spPr>
-          <a:xfrm>
-            <a:off x="838200" y="1825625"/>
-            <a:ext cx="10515600" cy="3012098"/>
-          </a:xfrm>
-          <a:solidFill>
-            <a:schemeClr val="accent1">
-              <a:lumMod val="40000"/>
-              <a:lumOff val="60000"/>
-            </a:schemeClr>
-          </a:solidFill>
-        </p:spPr>
-        <p:txBody>
-          <a:bodyPr>
-            <a:normAutofit fontScale="62500" lnSpcReduction="20000"/>
-          </a:bodyPr>
-          <a:lstStyle/>
-          <a:p>
-            <a:pPr marL="0" indent="0">
-              <a:buNone/>
-            </a:pPr>
-            <a:r>
-              <a:rPr lang="en-US" dirty="0" err="1"/>
-              <a:t>var</a:t>
-            </a:r>
-            <a:r>
-              <a:rPr lang="en-US" dirty="0"/>
-              <a:t> </a:t>
-            </a:r>
-            <a:r>
-              <a:rPr lang="en-US" dirty="0" err="1"/>
-              <a:t>xhttp</a:t>
-            </a:r>
-            <a:r>
-              <a:rPr lang="en-US" dirty="0"/>
-              <a:t> = new </a:t>
-            </a:r>
-            <a:r>
-              <a:rPr lang="en-US" dirty="0" err="1"/>
-              <a:t>XMLHttpRequest</a:t>
-            </a:r>
-            <a:r>
-              <a:rPr lang="en-US" dirty="0" smtClean="0"/>
-              <a:t>();</a:t>
-            </a:r>
-          </a:p>
-          <a:p>
-            <a:pPr marL="0" indent="0">
-              <a:buNone/>
-            </a:pPr>
-            <a:r>
-              <a:rPr lang="en-US" dirty="0"/>
-              <a:t/>
-            </a:r>
-            <a:br>
-              <a:rPr lang="en-US" dirty="0"/>
-            </a:br>
-            <a:r>
-              <a:rPr lang="en-US" dirty="0" err="1"/>
-              <a:t>xhttp.onreadystatechange</a:t>
-            </a:r>
-            <a:r>
-              <a:rPr lang="en-US" dirty="0"/>
-              <a:t> = function() {</a:t>
-            </a:r>
-            <a:br>
-              <a:rPr lang="en-US" dirty="0"/>
-            </a:br>
-            <a:r>
-              <a:rPr lang="en-US" dirty="0"/>
-              <a:t>    if (</a:t>
-            </a:r>
-            <a:r>
-              <a:rPr lang="en-US" dirty="0" err="1"/>
-              <a:t>this.readyState</a:t>
-            </a:r>
-            <a:r>
-              <a:rPr lang="en-US" dirty="0"/>
-              <a:t> == 4 &amp;&amp; </a:t>
-            </a:r>
-            <a:r>
-              <a:rPr lang="en-US" dirty="0" err="1"/>
-              <a:t>this.status</a:t>
-            </a:r>
-            <a:r>
-              <a:rPr lang="en-US" dirty="0"/>
-              <a:t> == 200) </a:t>
-            </a:r>
-            <a:r>
-              <a:rPr lang="en-US" dirty="0" smtClean="0"/>
-              <a:t>{</a:t>
-            </a:r>
-          </a:p>
-          <a:p>
-            <a:pPr marL="0" indent="0">
-              <a:buNone/>
-            </a:pPr>
-            <a:r>
-              <a:rPr lang="en-US" dirty="0"/>
-              <a:t/>
-            </a:r>
-            <a:br>
-              <a:rPr lang="en-US" dirty="0"/>
-            </a:br>
-            <a:r>
-              <a:rPr lang="en-US" dirty="0"/>
-              <a:t>       // Typical action to be performed when the document is ready:</a:t>
-            </a:r>
-            <a:br>
-              <a:rPr lang="en-US" dirty="0"/>
-            </a:br>
-            <a:r>
-              <a:rPr lang="en-US" dirty="0"/>
-              <a:t>       </a:t>
-            </a:r>
-            <a:r>
-              <a:rPr lang="en-US" dirty="0" err="1"/>
-              <a:t>document.getElementById</a:t>
-            </a:r>
-            <a:r>
-              <a:rPr lang="en-US" dirty="0"/>
-              <a:t>("demo").</a:t>
-            </a:r>
-            <a:r>
-              <a:rPr lang="en-US" dirty="0" err="1"/>
-              <a:t>innerHTML</a:t>
-            </a:r>
-            <a:r>
-              <a:rPr lang="en-US" dirty="0"/>
-              <a:t> = </a:t>
-            </a:r>
-            <a:r>
-              <a:rPr lang="en-US" dirty="0" err="1"/>
-              <a:t>xhttp.responseText</a:t>
-            </a:r>
-            <a:r>
-              <a:rPr lang="en-US" dirty="0"/>
-              <a:t>;</a:t>
-            </a:r>
-            <a:br>
-              <a:rPr lang="en-US" dirty="0"/>
-            </a:br>
-            <a:r>
-              <a:rPr lang="en-US" dirty="0"/>
-              <a:t>    }</a:t>
-            </a:r>
-            <a:br>
-              <a:rPr lang="en-US" dirty="0"/>
-            </a:br>
-            <a:r>
-              <a:rPr lang="en-US" dirty="0" smtClean="0"/>
-              <a:t>};</a:t>
-            </a:r>
-          </a:p>
-          <a:p>
-            <a:pPr marL="0" indent="0">
-              <a:buNone/>
-            </a:pPr>
-            <a:r>
-              <a:rPr lang="en-US" dirty="0"/>
-              <a:t/>
-            </a:r>
-            <a:br>
-              <a:rPr lang="en-US" dirty="0"/>
-            </a:br>
-            <a:r>
-              <a:rPr lang="en-US" dirty="0" err="1"/>
-              <a:t>xhttp.open</a:t>
-            </a:r>
-            <a:r>
-              <a:rPr lang="en-US" dirty="0"/>
-              <a:t>("GET", "</a:t>
-            </a:r>
-            <a:r>
-              <a:rPr lang="en-US" i="1" dirty="0"/>
-              <a:t>filename</a:t>
-            </a:r>
-            <a:r>
-              <a:rPr lang="en-US" dirty="0"/>
-              <a:t>", true);</a:t>
-            </a:r>
-            <a:br>
-              <a:rPr lang="en-US" dirty="0"/>
-            </a:br>
-            <a:r>
-              <a:rPr lang="en-US" dirty="0" err="1"/>
-              <a:t>xhttp.send</a:t>
-            </a:r>
-            <a:r>
-              <a:rPr lang="en-US" dirty="0" smtClean="0"/>
-              <a:t>();</a:t>
-            </a:r>
-          </a:p>
-          <a:p>
-            <a:pPr marL="0" indent="0">
-              <a:buNone/>
-            </a:pPr>
-            <a:endParaRPr lang="en-US" dirty="0"/>
+          <a:p>
+            <a:r>
+              <a:rPr lang="en-US" dirty="0" smtClean="0"/>
+              <a:t>What route could we use to get a list of all users? One specific user?</a:t>
+            </a:r>
+          </a:p>
+          <a:p>
+            <a:endParaRPr lang="en-US" dirty="0" smtClean="0">
+              <a:solidFill>
+                <a:srgbClr val="00B050"/>
+              </a:solidFill>
+            </a:endParaRPr>
+          </a:p>
+          <a:p>
+            <a:endParaRPr lang="en-US" dirty="0">
+              <a:solidFill>
+                <a:srgbClr val="00B050"/>
+              </a:solidFill>
+            </a:endParaRPr>
           </a:p>
         </p:txBody>
       </p:sp>
@@ -3381,34 +3502,406 @@
           </a:prstGeom>
         </p:spPr>
       </p:pic>
-      <p:sp>
-        <p:nvSpPr>
-          <p:cNvPr id="5" name="Rectangle 4"/>
-          <p:cNvSpPr/>
-          <p:nvPr/>
+    </p:spTree>
+    <p:extLst>
+      <p:ext uri="{BB962C8B-B14F-4D97-AF65-F5344CB8AC3E}">
+        <p14:creationId xmlns:p14="http://schemas.microsoft.com/office/powerpoint/2010/main" val="473121749"/>
+      </p:ext>
+    </p:extLst>
+  </p:cSld>
+  <p:clrMapOvr>
+    <a:masterClrMapping/>
+  </p:clrMapOvr>
+  <p:timing>
+    <p:tnLst>
+      <p:par>
+        <p:cTn id="1" dur="indefinite" restart="never" nodeType="tmRoot"/>
+      </p:par>
+    </p:tnLst>
+  </p:timing>
+</p:sld>
+</file>
+
+<file path=ppt/slides/slide11.xml><?xml version="1.0" encoding="utf-8"?>
+<p:sld xmlns:a="http://schemas.openxmlformats.org/drawingml/2006/main" xmlns:r="http://schemas.openxmlformats.org/officeDocument/2006/relationships" xmlns:p="http://schemas.openxmlformats.org/presentationml/2006/main">
+  <p:cSld>
+    <p:spTree>
+      <p:nvGrpSpPr>
+        <p:cNvPr id="1" name=""/>
+        <p:cNvGrpSpPr/>
+        <p:nvPr/>
+      </p:nvGrpSpPr>
+      <p:grpSpPr>
+        <a:xfrm>
+          <a:off x="0" y="0"/>
+          <a:ext cx="0" cy="0"/>
+          <a:chOff x="0" y="0"/>
+          <a:chExt cx="0" cy="0"/>
+        </a:xfrm>
+      </p:grpSpPr>
+      <p:sp>
+        <p:nvSpPr>
+          <p:cNvPr id="2" name="Title 1"/>
+          <p:cNvSpPr>
+            <a:spLocks noGrp="1"/>
+          </p:cNvSpPr>
+          <p:nvPr>
+            <p:ph type="title"/>
+          </p:nvPr>
+        </p:nvSpPr>
+        <p:spPr/>
+        <p:txBody>
+          <a:bodyPr/>
+          <a:lstStyle/>
+          <a:p>
+            <a:r>
+              <a:rPr lang="en-US" dirty="0" smtClean="0"/>
+              <a:t>Web API </a:t>
+            </a:r>
+            <a:r>
+              <a:rPr lang="mr-IN" dirty="0" smtClean="0"/>
+              <a:t>–</a:t>
+            </a:r>
+            <a:r>
+              <a:rPr lang="en-US" dirty="0"/>
+              <a:t> </a:t>
+            </a:r>
+            <a:r>
+              <a:rPr lang="en-US" dirty="0" err="1" smtClean="0"/>
+              <a:t>XMLHttpRequest</a:t>
+            </a:r>
+            <a:endParaRPr lang="en-US" dirty="0"/>
+          </a:p>
+        </p:txBody>
+      </p:sp>
+      <p:sp>
+        <p:nvSpPr>
+          <p:cNvPr id="3" name="Content Placeholder 2"/>
+          <p:cNvSpPr>
+            <a:spLocks noGrp="1"/>
+          </p:cNvSpPr>
+          <p:nvPr>
+            <p:ph idx="1"/>
+          </p:nvPr>
         </p:nvSpPr>
         <p:spPr>
           <a:xfrm>
-            <a:off x="838200" y="4972660"/>
-            <a:ext cx="5373202" cy="369332"/>
+            <a:off x="838200" y="2591533"/>
+            <a:ext cx="10515600" cy="3012098"/>
+          </a:xfrm>
+          <a:solidFill>
+            <a:schemeClr val="accent1">
+              <a:lumMod val="40000"/>
+              <a:lumOff val="60000"/>
+            </a:schemeClr>
+          </a:solidFill>
+        </p:spPr>
+        <p:txBody>
+          <a:bodyPr>
+            <a:normAutofit fontScale="62500" lnSpcReduction="20000"/>
+          </a:bodyPr>
+          <a:lstStyle/>
+          <a:p>
+            <a:pPr marL="0" indent="0">
+              <a:buNone/>
+            </a:pPr>
+            <a:r>
+              <a:rPr lang="en-US" dirty="0" err="1"/>
+              <a:t>var</a:t>
+            </a:r>
+            <a:r>
+              <a:rPr lang="en-US" dirty="0"/>
+              <a:t> </a:t>
+            </a:r>
+            <a:r>
+              <a:rPr lang="en-US" dirty="0" err="1"/>
+              <a:t>xhttp</a:t>
+            </a:r>
+            <a:r>
+              <a:rPr lang="en-US" dirty="0"/>
+              <a:t> = new </a:t>
+            </a:r>
+            <a:r>
+              <a:rPr lang="en-US" dirty="0" err="1"/>
+              <a:t>XMLHttpRequest</a:t>
+            </a:r>
+            <a:r>
+              <a:rPr lang="en-US" dirty="0" smtClean="0"/>
+              <a:t>();</a:t>
+            </a:r>
+          </a:p>
+          <a:p>
+            <a:pPr marL="0" indent="0">
+              <a:buNone/>
+            </a:pPr>
+            <a:r>
+              <a:rPr lang="en-US" dirty="0"/>
+              <a:t/>
+            </a:r>
+            <a:br>
+              <a:rPr lang="en-US" dirty="0"/>
+            </a:br>
+            <a:r>
+              <a:rPr lang="en-US" dirty="0" err="1"/>
+              <a:t>xhttp.onreadystatechange</a:t>
+            </a:r>
+            <a:r>
+              <a:rPr lang="en-US" dirty="0"/>
+              <a:t> = function() {</a:t>
+            </a:r>
+            <a:br>
+              <a:rPr lang="en-US" dirty="0"/>
+            </a:br>
+            <a:r>
+              <a:rPr lang="en-US" dirty="0"/>
+              <a:t>    if (</a:t>
+            </a:r>
+            <a:r>
+              <a:rPr lang="en-US" dirty="0" err="1"/>
+              <a:t>this.readyState</a:t>
+            </a:r>
+            <a:r>
+              <a:rPr lang="en-US" dirty="0"/>
+              <a:t> == 4 &amp;&amp; </a:t>
+            </a:r>
+            <a:r>
+              <a:rPr lang="en-US" dirty="0" err="1"/>
+              <a:t>this.status</a:t>
+            </a:r>
+            <a:r>
+              <a:rPr lang="en-US" dirty="0"/>
+              <a:t> == 200) </a:t>
+            </a:r>
+            <a:r>
+              <a:rPr lang="en-US" dirty="0" smtClean="0"/>
+              <a:t>{</a:t>
+            </a:r>
+          </a:p>
+          <a:p>
+            <a:pPr marL="0" indent="0">
+              <a:buNone/>
+            </a:pPr>
+            <a:r>
+              <a:rPr lang="en-US" dirty="0" smtClean="0"/>
+              <a:t>        //decode response text from </a:t>
+            </a:r>
+            <a:r>
+              <a:rPr lang="en-US" dirty="0" err="1" smtClean="0"/>
+              <a:t>stringified</a:t>
+            </a:r>
+            <a:r>
+              <a:rPr lang="en-US" dirty="0" smtClean="0"/>
+              <a:t> JSON to an object</a:t>
+            </a:r>
+          </a:p>
+          <a:p>
+            <a:pPr marL="0" indent="0">
+              <a:buNone/>
+            </a:pPr>
+            <a:r>
+              <a:rPr lang="en-US" dirty="0"/>
+              <a:t> </a:t>
+            </a:r>
+            <a:r>
+              <a:rPr lang="en-US" dirty="0" smtClean="0"/>
+              <a:t>       </a:t>
+            </a:r>
+            <a:r>
+              <a:rPr lang="en-US" dirty="0" err="1" smtClean="0"/>
+              <a:t>var</a:t>
+            </a:r>
+            <a:r>
+              <a:rPr lang="en-US" dirty="0" smtClean="0"/>
+              <a:t> data = </a:t>
+            </a:r>
+            <a:r>
+              <a:rPr lang="en-US" dirty="0" err="1" smtClean="0"/>
+              <a:t>JSON.parse</a:t>
+            </a:r>
+            <a:r>
+              <a:rPr lang="en-US" dirty="0" smtClean="0"/>
+              <a:t>(</a:t>
+            </a:r>
+            <a:r>
+              <a:rPr lang="en-US" dirty="0" err="1" smtClean="0"/>
+              <a:t>xhttp.responseText</a:t>
+            </a:r>
+            <a:r>
+              <a:rPr lang="en-US" dirty="0" smtClean="0"/>
+              <a:t>);</a:t>
+            </a:r>
+            <a:r>
+              <a:rPr lang="en-US" dirty="0"/>
+              <a:t/>
+            </a:r>
+            <a:br>
+              <a:rPr lang="en-US" dirty="0"/>
+            </a:br>
+            <a:r>
+              <a:rPr lang="en-US" dirty="0" smtClean="0"/>
+              <a:t>        </a:t>
+            </a:r>
+            <a:r>
+              <a:rPr lang="en-US" dirty="0" err="1" smtClean="0"/>
+              <a:t>console.log</a:t>
+            </a:r>
+            <a:r>
+              <a:rPr lang="en-US" dirty="0" smtClean="0"/>
+              <a:t>(data);</a:t>
+            </a:r>
+            <a:r>
+              <a:rPr lang="en-US" dirty="0"/>
+              <a:t/>
+            </a:r>
+            <a:br>
+              <a:rPr lang="en-US" dirty="0"/>
+            </a:br>
+            <a:r>
+              <a:rPr lang="en-US" dirty="0"/>
+              <a:t>    }</a:t>
+            </a:r>
+            <a:br>
+              <a:rPr lang="en-US" dirty="0"/>
+            </a:br>
+            <a:r>
+              <a:rPr lang="en-US" dirty="0" smtClean="0"/>
+              <a:t>};</a:t>
+            </a:r>
+          </a:p>
+          <a:p>
+            <a:pPr marL="0" indent="0">
+              <a:buNone/>
+            </a:pPr>
+            <a:r>
+              <a:rPr lang="en-US" dirty="0"/>
+              <a:t/>
+            </a:r>
+            <a:br>
+              <a:rPr lang="en-US" dirty="0"/>
+            </a:br>
+            <a:r>
+              <a:rPr lang="en-US" dirty="0" err="1"/>
+              <a:t>xhttp.open</a:t>
+            </a:r>
+            <a:r>
+              <a:rPr lang="en-US" dirty="0" smtClean="0"/>
+              <a:t>(”</a:t>
+            </a:r>
+            <a:r>
+              <a:rPr lang="en-US" dirty="0" smtClean="0">
+                <a:solidFill>
+                  <a:srgbClr val="FF0000"/>
+                </a:solidFill>
+              </a:rPr>
+              <a:t>GET/POST/PUT/DELETE</a:t>
+            </a:r>
+            <a:r>
+              <a:rPr lang="en-US" dirty="0" smtClean="0"/>
+              <a:t>", ”</a:t>
+            </a:r>
+            <a:r>
+              <a:rPr lang="en-US" i="1" dirty="0" smtClean="0">
+                <a:solidFill>
+                  <a:srgbClr val="FF0000"/>
+                </a:solidFill>
+              </a:rPr>
+              <a:t>API/VERSION/ROUTE_TO_RESOURCE</a:t>
+            </a:r>
+            <a:r>
+              <a:rPr lang="en-US" dirty="0" smtClean="0"/>
+              <a:t>", </a:t>
+            </a:r>
+            <a:r>
+              <a:rPr lang="en-US" dirty="0"/>
+              <a:t>true);</a:t>
+            </a:r>
+            <a:br>
+              <a:rPr lang="en-US" dirty="0"/>
+            </a:br>
+            <a:r>
+              <a:rPr lang="en-US" dirty="0" err="1"/>
+              <a:t>xhttp.send</a:t>
+            </a:r>
+            <a:r>
+              <a:rPr lang="en-US" dirty="0" smtClean="0"/>
+              <a:t>();</a:t>
+            </a:r>
+          </a:p>
+          <a:p>
+            <a:pPr marL="0" indent="0">
+              <a:buNone/>
+            </a:pPr>
+            <a:endParaRPr lang="en-US" dirty="0"/>
+          </a:p>
+        </p:txBody>
+      </p:sp>
+      <p:pic>
+        <p:nvPicPr>
+          <p:cNvPr id="4" name="Picture 3"/>
+          <p:cNvPicPr>
+            <a:picLocks noChangeAspect="1"/>
+          </p:cNvPicPr>
+          <p:nvPr/>
+        </p:nvPicPr>
+        <p:blipFill>
+          <a:blip r:embed="rId2">
+            <a:extLst>
+              <a:ext uri="{28A0092B-C50C-407E-A947-70E740481C1C}">
+                <a14:useLocalDpi xmlns:a14="http://schemas.microsoft.com/office/drawing/2010/main" val="0"/>
+              </a:ext>
+            </a:extLst>
+          </a:blip>
+          <a:stretch>
+            <a:fillRect/>
+          </a:stretch>
+        </p:blipFill>
+        <p:spPr>
+          <a:xfrm>
+            <a:off x="10668000" y="5926015"/>
+            <a:ext cx="1476375" cy="698500"/>
           </a:xfrm>
           <a:prstGeom prst="rect">
             <a:avLst/>
           </a:prstGeom>
         </p:spPr>
-        <p:txBody>
-          <a:bodyPr wrap="none">
+      </p:pic>
+      <p:sp>
+        <p:nvSpPr>
+          <p:cNvPr id="6" name="TextBox 5"/>
+          <p:cNvSpPr txBox="1"/>
+          <p:nvPr/>
+        </p:nvSpPr>
+        <p:spPr>
+          <a:xfrm>
+            <a:off x="758093" y="1881194"/>
+            <a:ext cx="6638997" cy="369332"/>
+          </a:xfrm>
+          <a:prstGeom prst="rect">
+            <a:avLst/>
+          </a:prstGeom>
+          <a:noFill/>
+        </p:spPr>
+        <p:txBody>
+          <a:bodyPr wrap="none" rtlCol="0">
             <a:spAutoFit/>
           </a:bodyPr>
           <a:lstStyle/>
           <a:p>
             <a:r>
-              <a:rPr lang="en-US" dirty="0" smtClean="0"/>
-              <a:t>Source: https://www.w3schools.com/xml/</a:t>
-            </a:r>
-            <a:r>
               <a:rPr lang="en-US" dirty="0" err="1" smtClean="0"/>
-              <a:t>xml_http.asp</a:t>
+              <a:t>XMLHttpRequest</a:t>
+            </a:r>
+            <a:r>
+              <a:rPr lang="en-US" dirty="0" smtClean="0"/>
+              <a:t> is the plain </a:t>
+            </a:r>
+            <a:r>
+              <a:rPr lang="en-US" dirty="0" err="1" smtClean="0"/>
+              <a:t>Javascript</a:t>
+            </a:r>
+            <a:r>
+              <a:rPr lang="en-US" dirty="0" smtClean="0"/>
+              <a:t> way of making an API request:</a:t>
             </a:r>
             <a:endParaRPr lang="en-US" dirty="0"/>
           </a:p>
@@ -3434,7 +3927,7 @@
 </p:sld>
 </file>
 
-<file path=ppt/slides/slide11.xml><?xml version="1.0" encoding="utf-8"?>
+<file path=ppt/slides/slide12.xml><?xml version="1.0" encoding="utf-8"?>
 <p:sld xmlns:a="http://schemas.openxmlformats.org/drawingml/2006/main" xmlns:r="http://schemas.openxmlformats.org/officeDocument/2006/relationships" xmlns:p="http://schemas.openxmlformats.org/presentationml/2006/main">
   <p:cSld>
     <p:spTree>
@@ -4384,7 +4877,9 @@
         </p:nvSpPr>
         <p:spPr/>
         <p:txBody>
-          <a:bodyPr/>
+          <a:bodyPr>
+            <a:normAutofit lnSpcReduction="10000"/>
+          </a:bodyPr>
           <a:lstStyle/>
           <a:p>
             <a:r>
@@ -4449,13 +4944,57 @@
             </a:r>
           </a:p>
           <a:p>
-            <a:r>
-              <a:rPr lang="en-US" dirty="0" smtClean="0"/>
-              <a:t>Generally follows how your data is encapsulated</a:t>
-            </a:r>
-          </a:p>
-          <a:p>
+            <a:pPr marL="971550" lvl="1" indent="-514350">
+              <a:buFont typeface="+mj-lt"/>
+              <a:buAutoNum type="arabicPeriod"/>
+            </a:pPr>
             <a:endParaRPr lang="en-US" dirty="0"/>
+          </a:p>
+          <a:p>
+            <a:pPr marL="0" indent="0">
+              <a:buNone/>
+            </a:pPr>
+            <a:r>
+              <a:rPr lang="en-US" dirty="0" smtClean="0"/>
+              <a:t>E.g. https://</a:t>
+            </a:r>
+            <a:r>
+              <a:rPr lang="en-US" dirty="0" err="1" smtClean="0"/>
+              <a:t>mytodolists.com</a:t>
+            </a:r>
+            <a:r>
+              <a:rPr lang="en-US" dirty="0" smtClean="0">
+                <a:solidFill>
+                  <a:srgbClr val="FF0000"/>
+                </a:solidFill>
+              </a:rPr>
+              <a:t>/</a:t>
+            </a:r>
+            <a:r>
+              <a:rPr lang="en-US" dirty="0" err="1" smtClean="0">
+                <a:solidFill>
+                  <a:srgbClr val="FF0000"/>
+                </a:solidFill>
+              </a:rPr>
+              <a:t>api</a:t>
+            </a:r>
+            <a:r>
+              <a:rPr lang="en-US" dirty="0" smtClean="0">
+                <a:solidFill>
+                  <a:srgbClr val="FF0000"/>
+                </a:solidFill>
+              </a:rPr>
+              <a:t>/v1/lists </a:t>
+            </a:r>
+            <a:r>
+              <a:rPr lang="en-US" dirty="0" smtClean="0"/>
+              <a:t>-maps to a method that returns all lists ever created</a:t>
+            </a:r>
+            <a:endParaRPr lang="en-US" dirty="0" smtClean="0">
+              <a:solidFill>
+                <a:srgbClr val="FF0000"/>
+              </a:solidFill>
+            </a:endParaRPr>
           </a:p>
         </p:txBody>
       </p:sp>
@@ -4543,7 +5082,15 @@
           <a:p>
             <a:r>
               <a:rPr lang="en-US" dirty="0" smtClean="0"/>
-              <a:t>Web API - Routes for Lists</a:t>
+              <a:t>Web API </a:t>
+            </a:r>
+            <a:r>
+              <a:rPr lang="mr-IN" dirty="0" smtClean="0"/>
+              <a:t>–</a:t>
+            </a:r>
+            <a:r>
+              <a:rPr lang="en-US" dirty="0" smtClean="0"/>
+              <a:t> Input</a:t>
             </a:r>
             <a:endParaRPr lang="en-US" dirty="0"/>
           </a:p>
@@ -4562,31 +5109,68 @@
         <p:spPr/>
         <p:txBody>
           <a:bodyPr>
-            <a:normAutofit/>
+            <a:normAutofit fontScale="92500"/>
           </a:bodyPr>
           <a:lstStyle/>
           <a:p>
             <a:r>
               <a:rPr lang="en-US" dirty="0" smtClean="0"/>
-              <a:t>Suppose we have a web service that people can use to create personal lists:</a:t>
+              <a:t>Must be documented and </a:t>
+            </a:r>
+            <a:r>
+              <a:rPr lang="en-US" dirty="0" err="1" smtClean="0"/>
+              <a:t>consistant</a:t>
+            </a:r>
+            <a:endParaRPr lang="en-US" dirty="0" smtClean="0"/>
+          </a:p>
+          <a:p>
+            <a:r>
+              <a:rPr lang="en-US" dirty="0" smtClean="0"/>
+              <a:t>Typically passed by route path or by </a:t>
+            </a:r>
+            <a:r>
+              <a:rPr lang="en-US" dirty="0" err="1" smtClean="0"/>
+              <a:t>url</a:t>
+            </a:r>
+            <a:r>
+              <a:rPr lang="en-US" dirty="0" smtClean="0"/>
+              <a:t> query string</a:t>
             </a:r>
           </a:p>
           <a:p>
             <a:pPr lvl="1"/>
             <a:r>
               <a:rPr lang="en-US" dirty="0" smtClean="0"/>
-              <a:t>Get all/Create a lists for a user: </a:t>
-            </a:r>
-            <a:br>
-              <a:rPr lang="en-US" dirty="0" smtClean="0"/>
-            </a:br>
-            <a:r>
-              <a:rPr lang="en-US" dirty="0" smtClean="0"/>
-              <a:t>    </a:t>
+              <a:t>Route path used for locator inputs</a:t>
+            </a:r>
+          </a:p>
+          <a:p>
+            <a:pPr lvl="1"/>
+            <a:r>
+              <a:rPr lang="en-US" dirty="0" smtClean="0"/>
+              <a:t>Query string used for optional and filter inputs</a:t>
+            </a:r>
+          </a:p>
+          <a:p>
+            <a:r>
+              <a:rPr lang="en-US" dirty="0" smtClean="0"/>
+              <a:t>E.g. https://</a:t>
             </a:r>
             <a:r>
               <a:rPr lang="en-US" dirty="0" err="1" smtClean="0"/>
-              <a:t>mylists.com</a:t>
+              <a:t>mytodolists</a:t>
+            </a:r>
+            <a:r>
+              <a:rPr lang="en-US" dirty="0" smtClean="0"/>
+              <a:t>/</a:t>
+            </a:r>
+            <a:r>
+              <a:rPr lang="en-US" dirty="0" err="1" smtClean="0"/>
+              <a:t>api</a:t>
+            </a:r>
+            <a:r>
+              <a:rPr lang="en-US" dirty="0" smtClean="0"/>
+              <a:t>/v1/</a:t>
             </a:r>
             <a:r>
               <a:rPr lang="en-US" dirty="0" smtClean="0">
@@ -4594,7 +5178,7 @@
                   <a:srgbClr val="FF0000"/>
                 </a:solidFill>
               </a:rPr>
-              <a:t>/</a:t>
+              <a:t>user/</a:t>
             </a:r>
             <a:r>
               <a:rPr lang="en-US" dirty="0" err="1" smtClean="0">
@@ -4602,68 +5186,47 @@
                   <a:srgbClr val="FF0000"/>
                 </a:solidFill>
               </a:rPr>
-              <a:t>api</a:t>
-            </a:r>
-            <a:r>
-              <a:rPr lang="en-US" dirty="0" smtClean="0">
+              <a:t>derrick</a:t>
+            </a:r>
+            <a:r>
+              <a:rPr lang="en-US" dirty="0" err="1" smtClean="0">
                 <a:solidFill>
-                  <a:srgbClr val="FF0000"/>
+                  <a:schemeClr val="accent2">
+                    <a:lumMod val="50000"/>
+                  </a:schemeClr>
                 </a:solidFill>
               </a:rPr>
-              <a:t>/v1</a:t>
-            </a:r>
-            <a:r>
-              <a:rPr lang="en-US" dirty="0" smtClean="0"/>
-              <a:t>/</a:t>
+              <a:t>?</a:t>
+            </a:r>
+            <a:r>
+              <a:rPr lang="en-US" dirty="0" err="1" smtClean="0">
+                <a:solidFill>
+                  <a:schemeClr val="accent1">
+                    <a:lumMod val="50000"/>
+                  </a:schemeClr>
+                </a:solidFill>
+              </a:rPr>
+              <a:t>startdate</a:t>
             </a:r>
             <a:r>
               <a:rPr lang="en-US" dirty="0" smtClean="0">
                 <a:solidFill>
                   <a:schemeClr val="accent1">
-                    <a:lumMod val="75000"/>
+                    <a:lumMod val="50000"/>
                   </a:schemeClr>
                 </a:solidFill>
               </a:rPr>
-              <a:t>users/derrick</a:t>
-            </a:r>
-            <a:r>
-              <a:rPr lang="en-US" dirty="0" smtClean="0"/>
-              <a:t>/</a:t>
-            </a:r>
-            <a:r>
-              <a:rPr lang="en-US" dirty="0" smtClean="0">
+              <a:t>=</a:t>
+            </a:r>
+            <a:r>
+              <a:rPr lang="en-US" dirty="0" err="1" smtClean="0">
                 <a:solidFill>
-                  <a:srgbClr val="00B050"/>
+                  <a:schemeClr val="accent1">
+                    <a:lumMod val="50000"/>
+                  </a:schemeClr>
                 </a:solidFill>
               </a:rPr>
-              <a:t>lists</a:t>
-            </a:r>
-            <a:endParaRPr lang="en-US" dirty="0" smtClean="0"/>
-          </a:p>
-          <a:p>
-            <a:pPr lvl="1"/>
-            <a:r>
-              <a:rPr lang="en-US" dirty="0" smtClean="0"/>
-              <a:t>Get/Update a specific list for a user: </a:t>
-            </a:r>
-            <a:br>
-              <a:rPr lang="en-US" dirty="0" smtClean="0"/>
-            </a:br>
-            <a:r>
-              <a:rPr lang="en-US" dirty="0" smtClean="0"/>
-              <a:t>    </a:t>
-            </a:r>
-            <a:r>
-              <a:rPr lang="en-US" dirty="0" err="1" smtClean="0"/>
-              <a:t>mylists.com</a:t>
-            </a:r>
-            <a:r>
-              <a:rPr lang="en-US" dirty="0" smtClean="0">
-                <a:solidFill>
-                  <a:srgbClr val="FF0000"/>
-                </a:solidFill>
-              </a:rPr>
-              <a:t>/</a:t>
+              <a:t>first</a:t>
             </a:r>
             <a:r>
               <a:rPr lang="en-US" dirty="0" err="1" smtClean="0">
@@ -4671,224 +5234,66 @@
                   <a:srgbClr val="FF0000"/>
                 </a:solidFill>
               </a:rPr>
-              <a:t>api</a:t>
-            </a:r>
-            <a:r>
-              <a:rPr lang="en-US" dirty="0" smtClean="0">
+              <a:t>&amp;</a:t>
+            </a:r>
+            <a:r>
+              <a:rPr lang="en-US" dirty="0" err="1" smtClean="0">
                 <a:solidFill>
-                  <a:srgbClr val="FF0000"/>
-                </a:solidFill>
-              </a:rPr>
-              <a:t>/v1</a:t>
-            </a:r>
-            <a:r>
-              <a:rPr lang="en-US" dirty="0" smtClean="0"/>
-              <a:t>/</a:t>
-            </a:r>
-            <a:r>
-              <a:rPr lang="en-US" dirty="0" smtClean="0">
-                <a:solidFill>
-                  <a:schemeClr val="accent1">
-                    <a:lumMod val="75000"/>
+                  <a:schemeClr val="accent6">
+                    <a:lumMod val="50000"/>
                   </a:schemeClr>
                 </a:solidFill>
               </a:rPr>
-              <a:t>users/derrick</a:t>
-            </a:r>
-            <a:r>
-              <a:rPr lang="en-US" dirty="0" smtClean="0"/>
-              <a:t>/</a:t>
+              <a:t>enddate</a:t>
             </a:r>
             <a:r>
               <a:rPr lang="en-US" dirty="0" smtClean="0">
                 <a:solidFill>
-                  <a:srgbClr val="00B050"/>
-                </a:solidFill>
-              </a:rPr>
-              <a:t>lists/1</a:t>
-            </a:r>
-            <a:endParaRPr lang="en-US" dirty="0" smtClean="0"/>
-          </a:p>
-          <a:p>
-            <a:pPr lvl="1"/>
-            <a:r>
-              <a:rPr lang="en-US" dirty="0" smtClean="0"/>
-              <a:t>Get all/Add items from a list from a user:</a:t>
-            </a:r>
-            <a:br>
-              <a:rPr lang="en-US" dirty="0" smtClean="0"/>
-            </a:br>
-            <a:r>
-              <a:rPr lang="en-US" dirty="0" smtClean="0"/>
-              <a:t>    </a:t>
-            </a:r>
-            <a:r>
-              <a:rPr lang="en-US" dirty="0" err="1" smtClean="0"/>
-              <a:t>mylists.com</a:t>
-            </a:r>
-            <a:r>
-              <a:rPr lang="en-US" dirty="0" smtClean="0">
-                <a:solidFill>
-                  <a:srgbClr val="FF0000"/>
-                </a:solidFill>
-              </a:rPr>
-              <a:t>/</a:t>
-            </a:r>
-            <a:r>
-              <a:rPr lang="en-US" dirty="0" err="1" smtClean="0">
-                <a:solidFill>
-                  <a:srgbClr val="FF0000"/>
-                </a:solidFill>
-              </a:rPr>
-              <a:t>api</a:t>
-            </a:r>
-            <a:r>
-              <a:rPr lang="en-US" dirty="0" smtClean="0">
-                <a:solidFill>
-                  <a:srgbClr val="FF0000"/>
-                </a:solidFill>
-              </a:rPr>
-              <a:t>/v1</a:t>
-            </a:r>
-            <a:r>
-              <a:rPr lang="en-US" dirty="0" smtClean="0"/>
-              <a:t>/</a:t>
-            </a:r>
-            <a:r>
-              <a:rPr lang="en-US" dirty="0" smtClean="0">
-                <a:solidFill>
-                  <a:schemeClr val="accent1">
-                    <a:lumMod val="75000"/>
+                  <a:schemeClr val="accent6">
+                    <a:lumMod val="50000"/>
                   </a:schemeClr>
                 </a:solidFill>
               </a:rPr>
-              <a:t>users/derrick</a:t>
-            </a:r>
-            <a:r>
-              <a:rPr lang="en-US" dirty="0" smtClean="0"/>
-              <a:t>/</a:t>
-            </a:r>
-            <a:r>
-              <a:rPr lang="en-US" dirty="0" smtClean="0">
-                <a:solidFill>
-                  <a:srgbClr val="00B050"/>
-                </a:solidFill>
-              </a:rPr>
-              <a:t>lists/1</a:t>
-            </a:r>
-            <a:r>
-              <a:rPr lang="en-US" dirty="0" smtClean="0"/>
-              <a:t>/</a:t>
-            </a:r>
-            <a:r>
-              <a:rPr lang="en-US" dirty="0" smtClean="0">
-                <a:solidFill>
-                  <a:schemeClr val="accent2"/>
-                </a:solidFill>
-              </a:rPr>
-              <a:t>items</a:t>
-            </a:r>
-          </a:p>
-          <a:p>
-            <a:pPr lvl="1"/>
-            <a:r>
-              <a:rPr lang="en-US" dirty="0" smtClean="0"/>
-              <a:t>Get/Delete/Update a specific item from a list from a user:</a:t>
-            </a:r>
-            <a:br>
-              <a:rPr lang="en-US" dirty="0" smtClean="0"/>
-            </a:br>
-            <a:r>
-              <a:rPr lang="en-US" dirty="0" smtClean="0"/>
-              <a:t>    </a:t>
-            </a:r>
-            <a:r>
-              <a:rPr lang="en-US" dirty="0" err="1" smtClean="0"/>
-              <a:t>mylists.com</a:t>
-            </a:r>
-            <a:r>
-              <a:rPr lang="en-US" dirty="0" smtClean="0">
-                <a:solidFill>
-                  <a:srgbClr val="FF0000"/>
-                </a:solidFill>
-              </a:rPr>
-              <a:t>/</a:t>
-            </a:r>
-            <a:r>
-              <a:rPr lang="en-US" dirty="0" err="1" smtClean="0">
-                <a:solidFill>
-                  <a:srgbClr val="FF0000"/>
-                </a:solidFill>
-              </a:rPr>
-              <a:t>api</a:t>
-            </a:r>
-            <a:r>
-              <a:rPr lang="en-US" dirty="0" smtClean="0">
-                <a:solidFill>
-                  <a:srgbClr val="FF0000"/>
-                </a:solidFill>
-              </a:rPr>
-              <a:t>/v1</a:t>
-            </a:r>
-            <a:r>
-              <a:rPr lang="en-US" dirty="0" smtClean="0"/>
-              <a:t>/</a:t>
-            </a:r>
-            <a:r>
-              <a:rPr lang="en-US" dirty="0" smtClean="0">
-                <a:solidFill>
-                  <a:schemeClr val="accent1">
-                    <a:lumMod val="75000"/>
-                  </a:schemeClr>
-                </a:solidFill>
-              </a:rPr>
-              <a:t>users/derrick</a:t>
-            </a:r>
-            <a:r>
-              <a:rPr lang="en-US" dirty="0" smtClean="0"/>
-              <a:t>/</a:t>
-            </a:r>
-            <a:r>
-              <a:rPr lang="en-US" dirty="0" smtClean="0">
-                <a:solidFill>
-                  <a:srgbClr val="00B050"/>
-                </a:solidFill>
-              </a:rPr>
-              <a:t>lists/1</a:t>
-            </a:r>
-            <a:r>
-              <a:rPr lang="en-US" dirty="0" smtClean="0"/>
-              <a:t>/</a:t>
-            </a:r>
-            <a:r>
-              <a:rPr lang="en-US" dirty="0" smtClean="0">
-                <a:solidFill>
-                  <a:schemeClr val="accent2"/>
-                </a:solidFill>
-              </a:rPr>
-              <a:t>items/1</a:t>
-            </a:r>
-            <a:endParaRPr lang="en-US" dirty="0"/>
-          </a:p>
-          <a:p>
-            <a:r>
-              <a:rPr lang="en-US" dirty="0" smtClean="0"/>
-              <a:t>What route could we use to get a list of all users? One specific user?</a:t>
-            </a:r>
-          </a:p>
-          <a:p>
-            <a:endParaRPr lang="en-US" dirty="0" smtClean="0">
+              <a:t>=second</a:t>
+            </a:r>
+            <a:endParaRPr lang="en-US" dirty="0">
               <a:solidFill>
-                <a:srgbClr val="00B050"/>
+                <a:srgbClr val="FF0000"/>
               </a:solidFill>
             </a:endParaRPr>
           </a:p>
           <a:p>
-            <a:endParaRPr lang="en-US" dirty="0">
-              <a:solidFill>
-                <a:srgbClr val="00B050"/>
-              </a:solidFill>
-            </a:endParaRPr>
+            <a:pPr lvl="1"/>
+            <a:endParaRPr lang="en-US" dirty="0" smtClean="0"/>
+          </a:p>
+          <a:p>
+            <a:pPr lvl="1"/>
+            <a:endParaRPr lang="en-US" dirty="0"/>
+          </a:p>
+          <a:p>
+            <a:pPr lvl="1"/>
+            <a:endParaRPr lang="en-US" dirty="0" smtClean="0"/>
+          </a:p>
+          <a:p>
+            <a:pPr lvl="1"/>
+            <a:r>
+              <a:rPr lang="en-US" dirty="0" smtClean="0"/>
+              <a:t>both are secure ways of </a:t>
+            </a:r>
+            <a:r>
+              <a:rPr lang="en-US" dirty="0" err="1" smtClean="0"/>
+              <a:t>transfering</a:t>
+            </a:r>
+            <a:r>
+              <a:rPr lang="en-US" dirty="0" smtClean="0"/>
+              <a:t> data assuming your connection is SSL encrypted. Without SSL, this data is sent as clear text that can be sniffed.</a:t>
+            </a:r>
+          </a:p>
+          <a:p>
+            <a:pPr marL="0" indent="0">
+              <a:buNone/>
+            </a:pPr>
+            <a:endParaRPr lang="en-US" dirty="0"/>
           </a:p>
         </p:txBody>
       </p:sp>
@@ -4922,10 +5327,152 @@
           </a:prstGeom>
         </p:spPr>
       </p:pic>
+      <p:sp>
+        <p:nvSpPr>
+          <p:cNvPr id="5" name="Left Brace 4"/>
+          <p:cNvSpPr/>
+          <p:nvPr/>
+        </p:nvSpPr>
+        <p:spPr>
+          <a:xfrm rot="16200000">
+            <a:off x="4935313" y="3065691"/>
+            <a:ext cx="489860" cy="2653393"/>
+          </a:xfrm>
+          <a:prstGeom prst="leftBrace">
+            <a:avLst>
+              <a:gd name="adj1" fmla="val 8333"/>
+              <a:gd name="adj2" fmla="val 48370"/>
+            </a:avLst>
+          </a:prstGeom>
+        </p:spPr>
+        <p:style>
+          <a:lnRef idx="1">
+            <a:schemeClr val="accent1"/>
+          </a:lnRef>
+          <a:fillRef idx="0">
+            <a:schemeClr val="accent1"/>
+          </a:fillRef>
+          <a:effectRef idx="0">
+            <a:schemeClr val="accent1"/>
+          </a:effectRef>
+          <a:fontRef idx="minor">
+            <a:schemeClr val="tx1"/>
+          </a:fontRef>
+        </p:style>
+        <p:txBody>
+          <a:bodyPr rtlCol="0" anchor="ctr"/>
+          <a:lstStyle/>
+          <a:p>
+            <a:pPr algn="ctr"/>
+            <a:endParaRPr lang="en-US"/>
+          </a:p>
+        </p:txBody>
+      </p:sp>
+      <p:sp>
+        <p:nvSpPr>
+          <p:cNvPr id="6" name="Left Brace 5"/>
+          <p:cNvSpPr/>
+          <p:nvPr/>
+        </p:nvSpPr>
+        <p:spPr>
+          <a:xfrm rot="16200000">
+            <a:off x="8628292" y="2222670"/>
+            <a:ext cx="489860" cy="4395105"/>
+          </a:xfrm>
+          <a:prstGeom prst="leftBrace">
+            <a:avLst>
+              <a:gd name="adj1" fmla="val 8333"/>
+              <a:gd name="adj2" fmla="val 48370"/>
+            </a:avLst>
+          </a:prstGeom>
+        </p:spPr>
+        <p:style>
+          <a:lnRef idx="1">
+            <a:schemeClr val="accent1"/>
+          </a:lnRef>
+          <a:fillRef idx="0">
+            <a:schemeClr val="accent1"/>
+          </a:fillRef>
+          <a:effectRef idx="0">
+            <a:schemeClr val="accent1"/>
+          </a:effectRef>
+          <a:fontRef idx="minor">
+            <a:schemeClr val="tx1"/>
+          </a:fontRef>
+        </p:style>
+        <p:txBody>
+          <a:bodyPr rtlCol="0" anchor="ctr"/>
+          <a:lstStyle/>
+          <a:p>
+            <a:pPr algn="ctr"/>
+            <a:endParaRPr lang="en-US"/>
+          </a:p>
+        </p:txBody>
+      </p:sp>
+      <p:sp>
+        <p:nvSpPr>
+          <p:cNvPr id="7" name="TextBox 6"/>
+          <p:cNvSpPr txBox="1"/>
+          <p:nvPr/>
+        </p:nvSpPr>
+        <p:spPr>
+          <a:xfrm>
+            <a:off x="3990980" y="4637318"/>
+            <a:ext cx="1894114" cy="369332"/>
+          </a:xfrm>
+          <a:prstGeom prst="rect">
+            <a:avLst/>
+          </a:prstGeom>
+          <a:noFill/>
+        </p:spPr>
+        <p:txBody>
+          <a:bodyPr wrap="square" rtlCol="0">
+            <a:spAutoFit/>
+          </a:bodyPr>
+          <a:lstStyle/>
+          <a:p>
+            <a:r>
+              <a:rPr lang="en-US" smtClean="0"/>
+              <a:t>Route Parameters</a:t>
+            </a:r>
+            <a:endParaRPr lang="en-US"/>
+          </a:p>
+        </p:txBody>
+      </p:sp>
+      <p:sp>
+        <p:nvSpPr>
+          <p:cNvPr id="8" name="TextBox 7"/>
+          <p:cNvSpPr txBox="1"/>
+          <p:nvPr/>
+        </p:nvSpPr>
+        <p:spPr>
+          <a:xfrm>
+            <a:off x="8171770" y="4615424"/>
+            <a:ext cx="2139043" cy="369332"/>
+          </a:xfrm>
+          <a:prstGeom prst="rect">
+            <a:avLst/>
+          </a:prstGeom>
+          <a:noFill/>
+        </p:spPr>
+        <p:txBody>
+          <a:bodyPr wrap="square" rtlCol="0">
+            <a:spAutoFit/>
+          </a:bodyPr>
+          <a:lstStyle/>
+          <a:p>
+            <a:r>
+              <a:rPr lang="en-US" smtClean="0"/>
+              <a:t>Query string</a:t>
+            </a:r>
+            <a:endParaRPr lang="en-US"/>
+          </a:p>
+        </p:txBody>
+      </p:sp>
     </p:spTree>
     <p:extLst>
       <p:ext uri="{BB962C8B-B14F-4D97-AF65-F5344CB8AC3E}">
-        <p14:creationId xmlns:p14="http://schemas.microsoft.com/office/powerpoint/2010/main" val="473121749"/>
+        <p14:creationId xmlns:p14="http://schemas.microsoft.com/office/powerpoint/2010/main" val="1806323201"/>
       </p:ext>
     </p:extLst>
   </p:cSld>
@@ -4976,19 +5523,7 @@
           <a:p>
             <a:r>
               <a:rPr lang="en-US" dirty="0" smtClean="0"/>
-              <a:t>Web API </a:t>
-            </a:r>
-            <a:r>
-              <a:rPr lang="mr-IN" dirty="0" smtClean="0"/>
-              <a:t>–</a:t>
-            </a:r>
-            <a:r>
-              <a:rPr lang="en-US" dirty="0" smtClean="0"/>
-              <a:t> </a:t>
-            </a:r>
-            <a:r>
-              <a:rPr lang="en-US" dirty="0" err="1" smtClean="0"/>
-              <a:t>Input/Output</a:t>
+              <a:t>Web API - Output</a:t>
             </a:r>
             <a:endParaRPr lang="en-US" dirty="0"/>
           </a:p>
@@ -5004,7 +5539,12 @@
             <p:ph idx="1"/>
           </p:nvPr>
         </p:nvSpPr>
-        <p:spPr/>
+        <p:spPr>
+          <a:xfrm>
+            <a:off x="838200" y="1825625"/>
+            <a:ext cx="10515600" cy="1995261"/>
+          </a:xfrm>
+        </p:spPr>
         <p:txBody>
           <a:bodyPr/>
           <a:lstStyle/>
@@ -5023,89 +5563,36 @@
             </a:r>
           </a:p>
           <a:p>
-            <a:r>
-              <a:rPr lang="en-US" dirty="0" smtClean="0"/>
-              <a:t>Must be documented and </a:t>
+            <a:pPr lvl="1"/>
+            <a:r>
+              <a:rPr lang="en-US" dirty="0" smtClean="0"/>
+              <a:t>Human readable and easy to process with </a:t>
             </a:r>
             <a:r>
               <a:rPr lang="en-US" dirty="0" err="1" smtClean="0"/>
-              <a:t>consistant</a:t>
-            </a:r>
+              <a:t>Javascript</a:t>
+            </a:r>
+            <a:r>
+              <a:rPr lang="en-US" dirty="0" smtClean="0"/>
+              <a:t>!</a:t>
+            </a:r>
+          </a:p>
+          <a:p>
+            <a:pPr marL="457200" lvl="1" indent="0">
+              <a:buNone/>
+            </a:pPr>
             <a:endParaRPr lang="en-US" dirty="0" smtClean="0"/>
           </a:p>
           <a:p>
             <a:r>
               <a:rPr lang="en-US" dirty="0" smtClean="0"/>
-              <a:t>Input parameters can be passed via the URL or sent as formatted JSON</a:t>
-            </a:r>
-            <a:br>
-              <a:rPr lang="en-US" dirty="0" smtClean="0"/>
-            </a:br>
-            <a:r>
-              <a:rPr lang="en-US" dirty="0" smtClean="0"/>
-              <a:t>https://somesite/api/v1/someaction</a:t>
-            </a:r>
-            <a:r>
-              <a:rPr lang="en-US" dirty="0" smtClean="0">
-                <a:solidFill>
-                  <a:srgbClr val="FF0000"/>
-                </a:solidFill>
-              </a:rPr>
-              <a:t>?</a:t>
-            </a:r>
-            <a:r>
-              <a:rPr lang="en-US" dirty="0" smtClean="0">
-                <a:solidFill>
-                  <a:schemeClr val="accent1">
-                    <a:lumMod val="50000"/>
-                  </a:schemeClr>
-                </a:solidFill>
-              </a:rPr>
-              <a:t>param1=first</a:t>
-            </a:r>
-            <a:r>
-              <a:rPr lang="en-US" dirty="0" smtClean="0">
-                <a:solidFill>
-                  <a:srgbClr val="FF0000"/>
-                </a:solidFill>
-              </a:rPr>
-              <a:t>&amp;</a:t>
-            </a:r>
-            <a:r>
-              <a:rPr lang="en-US" dirty="0" smtClean="0">
-                <a:solidFill>
-                  <a:schemeClr val="accent6">
-                    <a:lumMod val="50000"/>
-                  </a:schemeClr>
-                </a:solidFill>
-              </a:rPr>
-              <a:t>param2=second</a:t>
-            </a:r>
-            <a:endParaRPr lang="en-US" dirty="0">
-              <a:solidFill>
-                <a:srgbClr val="FF0000"/>
-              </a:solidFill>
-            </a:endParaRPr>
-          </a:p>
-          <a:p>
-            <a:pPr lvl="1"/>
-            <a:r>
-              <a:rPr lang="en-US" dirty="0" smtClean="0"/>
-              <a:t>both are secure ways of </a:t>
-            </a:r>
-            <a:r>
-              <a:rPr lang="en-US" dirty="0" err="1" smtClean="0"/>
-              <a:t>transfering</a:t>
-            </a:r>
-            <a:r>
-              <a:rPr lang="en-US" dirty="0" smtClean="0"/>
-              <a:t> data assuming your connection is SSL encrypted. Without SSL, this data is sent as clear text that can be sniffed.</a:t>
-            </a:r>
-          </a:p>
-          <a:p>
-            <a:pPr marL="0" indent="0">
-              <a:buNone/>
-            </a:pPr>
+              <a:t>Like Input, must also be documented and consistent!</a:t>
+            </a:r>
+          </a:p>
+          <a:p>
+            <a:endParaRPr lang="en-US" dirty="0"/>
+          </a:p>
+          <a:p>
             <a:endParaRPr lang="en-US" dirty="0"/>
           </a:p>
         </p:txBody>
@@ -5140,10 +5627,128 @@
           </a:prstGeom>
         </p:spPr>
       </p:pic>
+      <p:sp>
+        <p:nvSpPr>
+          <p:cNvPr id="5" name="Rectangle 4"/>
+          <p:cNvSpPr/>
+          <p:nvPr/>
+        </p:nvSpPr>
+        <p:spPr>
+          <a:xfrm>
+            <a:off x="2449146" y="3955823"/>
+            <a:ext cx="7687408" cy="1754326"/>
+          </a:xfrm>
+          <a:prstGeom prst="rect">
+            <a:avLst/>
+          </a:prstGeom>
+          <a:solidFill>
+            <a:schemeClr val="accent1">
+              <a:lumMod val="60000"/>
+              <a:lumOff val="40000"/>
+            </a:schemeClr>
+          </a:solidFill>
+        </p:spPr>
+        <p:txBody>
+          <a:bodyPr wrap="square">
+            <a:spAutoFit/>
+          </a:bodyPr>
+          <a:lstStyle/>
+          <a:p>
+            <a:r>
+              <a:rPr lang="en-US" dirty="0" smtClean="0"/>
+              <a:t>{</a:t>
+            </a:r>
+            <a:br>
+              <a:rPr lang="en-US" dirty="0" smtClean="0"/>
+            </a:br>
+            <a:r>
+              <a:rPr lang="en-US" dirty="0" smtClean="0"/>
+              <a:t>  "</a:t>
+            </a:r>
+            <a:r>
+              <a:rPr lang="en-US" dirty="0" err="1" smtClean="0">
+                <a:solidFill>
+                  <a:srgbClr val="FF0000"/>
+                </a:solidFill>
+              </a:rPr>
+              <a:t>userId</a:t>
+            </a:r>
+            <a:r>
+              <a:rPr lang="en-US" dirty="0" smtClean="0"/>
+              <a:t>": 1,</a:t>
+            </a:r>
+            <a:br>
+              <a:rPr lang="en-US" dirty="0" smtClean="0"/>
+            </a:br>
+            <a:r>
+              <a:rPr lang="en-US" dirty="0" smtClean="0"/>
+              <a:t>  "</a:t>
+            </a:r>
+            <a:r>
+              <a:rPr lang="en-US" dirty="0" smtClean="0">
+                <a:solidFill>
+                  <a:srgbClr val="FF0000"/>
+                </a:solidFill>
+              </a:rPr>
+              <a:t>id</a:t>
+            </a:r>
+            <a:r>
+              <a:rPr lang="en-US" dirty="0" smtClean="0"/>
+              <a:t>": 1,</a:t>
+            </a:r>
+            <a:br>
+              <a:rPr lang="en-US" dirty="0" smtClean="0"/>
+            </a:br>
+            <a:r>
+              <a:rPr lang="en-US" dirty="0" smtClean="0"/>
+              <a:t>  "</a:t>
+            </a:r>
+            <a:r>
+              <a:rPr lang="en-US" dirty="0" smtClean="0">
+                <a:solidFill>
+                  <a:srgbClr val="FF0000"/>
+                </a:solidFill>
+              </a:rPr>
+              <a:t>title</a:t>
+            </a:r>
+            <a:r>
+              <a:rPr lang="en-US" dirty="0" smtClean="0"/>
+              <a:t>": ”Some Title Here",</a:t>
+            </a:r>
+            <a:br>
+              <a:rPr lang="en-US" dirty="0" smtClean="0"/>
+            </a:br>
+            <a:r>
+              <a:rPr lang="en-US" dirty="0" smtClean="0"/>
+              <a:t>  "</a:t>
+            </a:r>
+            <a:r>
+              <a:rPr lang="en-US" dirty="0" smtClean="0">
+                <a:solidFill>
+                  <a:srgbClr val="FF0000"/>
+                </a:solidFill>
+              </a:rPr>
+              <a:t>body</a:t>
+            </a:r>
+            <a:r>
+              <a:rPr lang="en-US" dirty="0" smtClean="0"/>
+              <a:t>": ”Some Text Here"</a:t>
+            </a:r>
+            <a:br>
+              <a:rPr lang="en-US" dirty="0" smtClean="0"/>
+            </a:br>
+            <a:r>
+              <a:rPr lang="en-US" dirty="0" smtClean="0"/>
+              <a:t>}</a:t>
+            </a:r>
+            <a:endParaRPr lang="en-US" dirty="0"/>
+          </a:p>
+        </p:txBody>
+      </p:sp>
     </p:spTree>
     <p:extLst>
       <p:ext uri="{BB962C8B-B14F-4D97-AF65-F5344CB8AC3E}">
-        <p14:creationId xmlns:p14="http://schemas.microsoft.com/office/powerpoint/2010/main" val="1806323201"/>
+        <p14:creationId xmlns:p14="http://schemas.microsoft.com/office/powerpoint/2010/main" val="182911441"/>
       </p:ext>
     </p:extLst>
   </p:cSld>

</xml_diff>